<commit_message>
Ajuste TFM y actualización Slides
</commit_message>
<xml_diff>
--- a/Documentos/Modelling Colombia Economy- Stock-Flow Consistent Prototype Growth Model.pptx
+++ b/Documentos/Modelling Colombia Economy- Stock-Flow Consistent Prototype Growth Model.pptx
@@ -5,7 +5,7 @@
     <p:sldMasterId id="2147483660" r:id="rId1"/>
   </p:sldMasterIdLst>
   <p:notesMasterIdLst>
-    <p:notesMasterId r:id="rId14"/>
+    <p:notesMasterId r:id="rId19"/>
   </p:notesMasterIdLst>
   <p:sldIdLst>
     <p:sldId id="256" r:id="rId2"/>
@@ -18,8 +18,13 @@
     <p:sldId id="329" r:id="rId9"/>
     <p:sldId id="330" r:id="rId10"/>
     <p:sldId id="331" r:id="rId11"/>
-    <p:sldId id="327" r:id="rId12"/>
-    <p:sldId id="258" r:id="rId13"/>
+    <p:sldId id="332" r:id="rId12"/>
+    <p:sldId id="333" r:id="rId13"/>
+    <p:sldId id="334" r:id="rId14"/>
+    <p:sldId id="335" r:id="rId15"/>
+    <p:sldId id="337" r:id="rId16"/>
+    <p:sldId id="327" r:id="rId17"/>
+    <p:sldId id="258" r:id="rId18"/>
   </p:sldIdLst>
   <p:sldSz cx="12192000" cy="6858000"/>
   <p:notesSz cx="6858000" cy="9144000"/>
@@ -208,7 +213,7 @@
           <a:p>
             <a:fld id="{D42B63A8-CA22-F249-8B11-75777F973014}" type="datetimeFigureOut">
               <a:rPr lang="es-ES_tradnl" smtClean="0"/>
-              <a:t>05/10/2020</a:t>
+              <a:t>6/10/20</a:t>
             </a:fld>
             <a:endParaRPr lang="es-ES_tradnl"/>
           </a:p>
@@ -1495,7 +1500,7 @@
           <a:p>
             <a:fld id="{6C5AE33D-32CE-4125-A2FD-63556E695E13}" type="datetimeFigureOut">
               <a:rPr lang="es-CO" smtClean="0"/>
-              <a:t>5/10/2020</a:t>
+              <a:t>6/10/20</a:t>
             </a:fld>
             <a:endParaRPr lang="es-CO"/>
           </a:p>
@@ -2120,8 +2125,8 @@
           <a:chExt cx="0" cy="0"/>
         </a:xfrm>
       </p:grpSpPr>
-      <mc:AlternateContent xmlns:mc="http://schemas.openxmlformats.org/markup-compatibility/2006">
-        <mc:Choice xmlns:a14="http://schemas.microsoft.com/office/drawing/2010/main" Requires="a14">
+      <mc:AlternateContent xmlns:mc="http://schemas.openxmlformats.org/markup-compatibility/2006" xmlns:a14="http://schemas.microsoft.com/office/drawing/2010/main">
+        <mc:Choice Requires="a14">
           <p:sp>
             <p:nvSpPr>
               <p:cNvPr id="2" name="Marcador de contenido 1">
@@ -2833,7 +2838,7 @@
             </p:txBody>
           </p:sp>
         </mc:Choice>
-        <mc:Fallback>
+        <mc:Fallback xmlns="">
           <p:sp>
             <p:nvSpPr>
               <p:cNvPr id="2" name="Marcador de contenido 1">
@@ -2945,32 +2950,2363 @@
           <a:chExt cx="0" cy="0"/>
         </a:xfrm>
       </p:grpSpPr>
+      <mc:AlternateContent xmlns:mc="http://schemas.openxmlformats.org/markup-compatibility/2006" xmlns:a14="http://schemas.microsoft.com/office/drawing/2010/main">
+        <mc:Choice Requires="a14">
+          <p:sp>
+            <p:nvSpPr>
+              <p:cNvPr id="2" name="Marcador de contenido 1">
+                <a:extLst>
+                  <a:ext uri="{FF2B5EF4-FFF2-40B4-BE49-F238E27FC236}">
+                    <a16:creationId xmlns:a16="http://schemas.microsoft.com/office/drawing/2014/main" id="{1E76053E-E553-4C2C-919A-CE7A30FA73F9}"/>
+                  </a:ext>
+                </a:extLst>
+              </p:cNvPr>
+              <p:cNvSpPr>
+                <a:spLocks noGrp="1"/>
+              </p:cNvSpPr>
+              <p:nvPr>
+                <p:ph idx="1"/>
+              </p:nvPr>
+            </p:nvSpPr>
+            <p:spPr>
+              <a:xfrm>
+                <a:off x="588471" y="1858995"/>
+                <a:ext cx="10628026" cy="3927423"/>
+              </a:xfrm>
+            </p:spPr>
+            <p:txBody>
+              <a:bodyPr>
+                <a:noAutofit/>
+              </a:bodyPr>
+              <a:lstStyle/>
+              <a:p>
+                <a:pPr algn="just"/>
+                <a:r>
+                  <a:rPr lang="en-GB" sz="2000" dirty="0">
+                    <a:effectLst/>
+                    <a:latin typeface="Century Gothic" panose="020B0502020202020204" pitchFamily="34" charset="0"/>
+                    <a:ea typeface="Times New Roman" panose="02020603050405020304" pitchFamily="18" charset="0"/>
+                  </a:rPr>
+                  <a:t> </a:t>
+                </a:r>
+                <a:r>
+                  <a:rPr lang="es-CO" sz="2000" dirty="0">
+                    <a:latin typeface="Century Gothic" panose="020B0502020202020204" pitchFamily="34" charset="0"/>
+                    <a:ea typeface="Times New Roman" panose="02020603050405020304" pitchFamily="18" charset="0"/>
+                  </a:rPr>
+                  <a:t>The number of shares issued is defined as a proportion of the change in capital</a:t>
+                </a:r>
+                <a:endParaRPr lang="es-CO" sz="2000" dirty="0">
+                  <a:effectLst/>
+                  <a:latin typeface="Century Gothic" panose="020B0502020202020204" pitchFamily="34" charset="0"/>
+                  <a:ea typeface="Calibri" panose="020F0502020204030204" pitchFamily="34" charset="0"/>
+                  <a:cs typeface="Times New Roman" panose="02020603050405020304" pitchFamily="18" charset="0"/>
+                </a:endParaRPr>
+              </a:p>
+              <a:p>
+                <a:pPr marL="0" indent="0" algn="just">
+                  <a:buNone/>
+                </a:pPr>
+                <a:endParaRPr lang="en-GB" sz="2000" dirty="0">
+                  <a:latin typeface="Century Gothic" panose="020B0502020202020204" pitchFamily="34" charset="0"/>
+                </a:endParaRPr>
+              </a:p>
+              <a:p>
+                <a:pPr marL="0" indent="0" algn="just">
+                  <a:lnSpc>
+                    <a:spcPct val="107000"/>
+                  </a:lnSpc>
+                  <a:spcAft>
+                    <a:spcPts val="800"/>
+                  </a:spcAft>
+                  <a:buNone/>
+                </a:pPr>
+                <a:endParaRPr lang="es-CO" sz="1800" dirty="0">
+                  <a:effectLst/>
+                  <a:latin typeface="Calibri" panose="020F0502020204030204" pitchFamily="34" charset="0"/>
+                  <a:ea typeface="Calibri" panose="020F0502020204030204" pitchFamily="34" charset="0"/>
+                  <a:cs typeface="Times New Roman" panose="02020603050405020304" pitchFamily="18" charset="0"/>
+                </a:endParaRPr>
+              </a:p>
+              <a:p>
+                <a:pPr marL="0" indent="0" algn="just">
+                  <a:buNone/>
+                </a:pPr>
+                <a14:m>
+                  <m:oMathPara xmlns:m="http://schemas.openxmlformats.org/officeDocument/2006/math">
+                    <m:oMathParaPr>
+                      <m:jc m:val="centerGroup"/>
+                    </m:oMathParaPr>
+                    <m:oMath xmlns:m="http://schemas.openxmlformats.org/officeDocument/2006/math">
+                      <m:acc>
+                        <m:accPr>
+                          <m:chr m:val="̇"/>
+                          <m:ctrlPr>
+                            <a:rPr lang="es-CO" sz="1800" i="1">
+                              <a:latin typeface="Cambria Math" panose="02040503050406030204" pitchFamily="18" charset="0"/>
+                              <a:ea typeface="Cambria Math" panose="02040503050406030204" pitchFamily="18" charset="0"/>
+                            </a:rPr>
+                          </m:ctrlPr>
+                        </m:accPr>
+                        <m:e>
+                          <m:r>
+                            <a:rPr lang="en-GB" sz="1800" i="1">
+                              <a:latin typeface="Cambria Math" panose="02040503050406030204" pitchFamily="18" charset="0"/>
+                              <a:ea typeface="Cambria Math" panose="02040503050406030204" pitchFamily="18" charset="0"/>
+                            </a:rPr>
+                            <m:t>𝐸</m:t>
+                          </m:r>
+                          <m:sSup>
+                            <m:sSupPr>
+                              <m:ctrlPr>
+                                <a:rPr lang="es-CO" sz="1800" i="1">
+                                  <a:latin typeface="Cambria Math" panose="02040503050406030204" pitchFamily="18" charset="0"/>
+                                  <a:ea typeface="Cambria Math" panose="02040503050406030204" pitchFamily="18" charset="0"/>
+                                </a:rPr>
+                              </m:ctrlPr>
+                            </m:sSupPr>
+                            <m:e>
+                              <m:r>
+                                <a:rPr lang="en-GB" sz="1800" i="1">
+                                  <a:latin typeface="Cambria Math" panose="02040503050406030204" pitchFamily="18" charset="0"/>
+                                  <a:ea typeface="Cambria Math" panose="02040503050406030204" pitchFamily="18" charset="0"/>
+                                </a:rPr>
+                                <m:t>𝑄</m:t>
+                              </m:r>
+                            </m:e>
+                            <m:sup>
+                              <m:r>
+                                <a:rPr lang="en-GB" sz="1800" i="1">
+                                  <a:latin typeface="Cambria Math" panose="02040503050406030204" pitchFamily="18" charset="0"/>
+                                  <a:ea typeface="Cambria Math" panose="02040503050406030204" pitchFamily="18" charset="0"/>
+                                </a:rPr>
+                                <m:t>𝑠</m:t>
+                              </m:r>
+                            </m:sup>
+                          </m:sSup>
+                        </m:e>
+                      </m:acc>
+                      <m:r>
+                        <a:rPr lang="en-GB" sz="1800" i="1">
+                          <a:latin typeface="Cambria Math" panose="02040503050406030204" pitchFamily="18" charset="0"/>
+                          <a:ea typeface="Cambria Math" panose="02040503050406030204" pitchFamily="18" charset="0"/>
+                        </a:rPr>
+                        <m:t>=</m:t>
+                      </m:r>
+                      <m:sSub>
+                        <m:sSubPr>
+                          <m:ctrlPr>
+                            <a:rPr lang="es-ES" sz="1800" b="0" i="1" smtClean="0">
+                              <a:latin typeface="Cambria Math" panose="02040503050406030204" pitchFamily="18" charset="0"/>
+                              <a:ea typeface="Cambria Math" panose="02040503050406030204" pitchFamily="18" charset="0"/>
+                            </a:rPr>
+                          </m:ctrlPr>
+                        </m:sSubPr>
+                        <m:e>
+                          <m:r>
+                            <a:rPr lang="en-GB" sz="1800" i="1" smtClean="0">
+                              <a:latin typeface="Cambria Math" panose="02040503050406030204" pitchFamily="18" charset="0"/>
+                              <a:ea typeface="Cambria Math" panose="02040503050406030204" pitchFamily="18" charset="0"/>
+                            </a:rPr>
+                            <m:t>𝜗</m:t>
+                          </m:r>
+                        </m:e>
+                        <m:sub>
+                          <m:r>
+                            <a:rPr lang="es-ES" sz="1800" b="0" i="1" smtClean="0">
+                              <a:latin typeface="Cambria Math" panose="02040503050406030204" pitchFamily="18" charset="0"/>
+                              <a:ea typeface="Cambria Math" panose="02040503050406030204" pitchFamily="18" charset="0"/>
+                            </a:rPr>
+                            <m:t>𝐸𝑄</m:t>
+                          </m:r>
+                        </m:sub>
+                      </m:sSub>
+                      <m:acc>
+                        <m:accPr>
+                          <m:chr m:val="̇"/>
+                          <m:ctrlPr>
+                            <a:rPr lang="es-CO" sz="1800" i="1">
+                              <a:latin typeface="Cambria Math" panose="02040503050406030204" pitchFamily="18" charset="0"/>
+                              <a:ea typeface="Cambria Math" panose="02040503050406030204" pitchFamily="18" charset="0"/>
+                            </a:rPr>
+                          </m:ctrlPr>
+                        </m:accPr>
+                        <m:e>
+                          <m:r>
+                            <a:rPr lang="en-GB" sz="1800" i="1">
+                              <a:latin typeface="Cambria Math" panose="02040503050406030204" pitchFamily="18" charset="0"/>
+                              <a:ea typeface="Cambria Math" panose="02040503050406030204" pitchFamily="18" charset="0"/>
+                            </a:rPr>
+                            <m:t>𝐾</m:t>
+                          </m:r>
+                          <m:r>
+                            <a:rPr lang="es-ES" sz="1800" b="0" i="1" smtClean="0">
+                              <a:latin typeface="Cambria Math" panose="02040503050406030204" pitchFamily="18" charset="0"/>
+                              <a:ea typeface="Cambria Math" panose="02040503050406030204" pitchFamily="18" charset="0"/>
+                            </a:rPr>
+                            <m:t> </m:t>
+                          </m:r>
+                        </m:e>
+                      </m:acc>
+                      <m:r>
+                        <a:rPr lang="es-ES" sz="1800" b="0" i="1" smtClean="0">
+                          <a:latin typeface="Cambria Math" panose="02040503050406030204" pitchFamily="18" charset="0"/>
+                          <a:ea typeface="Cambria Math" panose="02040503050406030204" pitchFamily="18" charset="0"/>
+                        </a:rPr>
+                        <m:t>(18)</m:t>
+                      </m:r>
+                    </m:oMath>
+                  </m:oMathPara>
+                </a14:m>
+                <a:endParaRPr lang="es-CO" sz="1800" dirty="0">
+                  <a:latin typeface="Cambria Math" panose="02040503050406030204" pitchFamily="18" charset="0"/>
+                  <a:ea typeface="Cambria Math" panose="02040503050406030204" pitchFamily="18" charset="0"/>
+                </a:endParaRPr>
+              </a:p>
+              <a:p>
+                <a:pPr marL="0" indent="0" algn="just">
+                  <a:buNone/>
+                </a:pPr>
+                <a:endParaRPr lang="en-GB" sz="2000" dirty="0">
+                  <a:latin typeface="Century Gothic" panose="020B0502020202020204" pitchFamily="34" charset="0"/>
+                </a:endParaRPr>
+              </a:p>
+              <a:p>
+                <a:pPr marL="0" indent="0" algn="just">
+                  <a:buNone/>
+                </a:pPr>
+                <a:endParaRPr lang="en-GB" sz="2000" dirty="0">
+                  <a:latin typeface="Century Gothic" panose="020B0502020202020204" pitchFamily="34" charset="0"/>
+                </a:endParaRPr>
+              </a:p>
+              <a:p>
+                <a:pPr algn="just"/>
+                <a:r>
+                  <a:rPr lang="en-GB" sz="2000" dirty="0">
+                    <a:latin typeface="Century Gothic" panose="020B0502020202020204" pitchFamily="34" charset="0"/>
+                  </a:rPr>
+                  <a:t>From equation 2 we know that FDI influences investment, and that the latter affects the capital </a:t>
+                </a:r>
+              </a:p>
+            </p:txBody>
+          </p:sp>
+        </mc:Choice>
+        <mc:Fallback xmlns="">
+          <p:sp>
+            <p:nvSpPr>
+              <p:cNvPr id="2" name="Marcador de contenido 1">
+                <a:extLst>
+                  <a:ext uri="{FF2B5EF4-FFF2-40B4-BE49-F238E27FC236}">
+                    <a16:creationId xmlns:a16="http://schemas.microsoft.com/office/drawing/2014/main" id="{1E76053E-E553-4C2C-919A-CE7A30FA73F9}"/>
+                  </a:ext>
+                </a:extLst>
+              </p:cNvPr>
+              <p:cNvSpPr>
+                <a:spLocks noGrp="1" noRot="1" noChangeAspect="1" noMove="1" noResize="1" noEditPoints="1" noAdjustHandles="1" noChangeArrowheads="1" noChangeShapeType="1" noTextEdit="1"/>
+              </p:cNvSpPr>
+              <p:nvPr>
+                <p:ph idx="1"/>
+              </p:nvPr>
+            </p:nvSpPr>
+            <p:spPr>
+              <a:xfrm>
+                <a:off x="588471" y="1858995"/>
+                <a:ext cx="10628026" cy="3927423"/>
+              </a:xfrm>
+              <a:blipFill>
+                <a:blip r:embed="rId2"/>
+                <a:stretch>
+                  <a:fillRect l="-477" t="-968" r="-597"/>
+                </a:stretch>
+              </a:blipFill>
+            </p:spPr>
+            <p:txBody>
+              <a:bodyPr/>
+              <a:lstStyle/>
+              <a:p>
+                <a:r>
+                  <a:rPr lang="es-CO">
+                    <a:noFill/>
+                  </a:rPr>
+                  <a:t> </a:t>
+                </a:r>
+              </a:p>
+            </p:txBody>
+          </p:sp>
+        </mc:Fallback>
+      </mc:AlternateContent>
+      <p:sp>
+        <p:nvSpPr>
+          <p:cNvPr id="3" name="Título 2">
+            <a:extLst>
+              <a:ext uri="{FF2B5EF4-FFF2-40B4-BE49-F238E27FC236}">
+                <a16:creationId xmlns:a16="http://schemas.microsoft.com/office/drawing/2014/main" id="{5DA68AA8-71CC-44C3-BE34-4520548865CD}"/>
+              </a:ext>
+            </a:extLst>
+          </p:cNvPr>
+          <p:cNvSpPr>
+            <a:spLocks noGrp="1"/>
+          </p:cNvSpPr>
+          <p:nvPr>
+            <p:ph type="title"/>
+          </p:nvPr>
+        </p:nvSpPr>
+        <p:spPr>
+          <a:xfrm>
+            <a:off x="687841" y="457517"/>
+            <a:ext cx="7694645" cy="979127"/>
+          </a:xfrm>
+        </p:spPr>
+        <p:txBody>
+          <a:bodyPr>
+            <a:noAutofit/>
+          </a:bodyPr>
+          <a:lstStyle/>
+          <a:p>
+            <a:pPr algn="l"/>
+            <a:r>
+              <a:rPr lang="es-CO" b="1" dirty="0">
+                <a:latin typeface="Century Gothic" panose="020B0502020202020204" pitchFamily="34" charset="0"/>
+              </a:rPr>
+              <a:t>Equities and ownership structure </a:t>
+            </a:r>
+          </a:p>
+        </p:txBody>
+      </p:sp>
+    </p:spTree>
+    <p:extLst>
+      <p:ext uri="{BB962C8B-B14F-4D97-AF65-F5344CB8AC3E}">
+        <p14:creationId xmlns:p14="http://schemas.microsoft.com/office/powerpoint/2010/main" val="2405578853"/>
+      </p:ext>
+    </p:extLst>
+  </p:cSld>
+  <p:clrMapOvr>
+    <a:masterClrMapping/>
+  </p:clrMapOvr>
+</p:sld>
+</file>
+
+<file path=ppt/slides/slide12.xml><?xml version="1.0" encoding="utf-8"?>
+<p:sld xmlns:a="http://schemas.openxmlformats.org/drawingml/2006/main" xmlns:r="http://schemas.openxmlformats.org/officeDocument/2006/relationships" xmlns:p="http://schemas.openxmlformats.org/presentationml/2006/main">
+  <p:cSld>
+    <p:spTree>
+      <p:nvGrpSpPr>
+        <p:cNvPr id="1" name=""/>
+        <p:cNvGrpSpPr/>
+        <p:nvPr/>
+      </p:nvGrpSpPr>
+      <p:grpSpPr>
+        <a:xfrm>
+          <a:off x="0" y="0"/>
+          <a:ext cx="0" cy="0"/>
+          <a:chOff x="0" y="0"/>
+          <a:chExt cx="0" cy="0"/>
+        </a:xfrm>
+      </p:grpSpPr>
+      <mc:AlternateContent xmlns:mc="http://schemas.openxmlformats.org/markup-compatibility/2006" xmlns:a14="http://schemas.microsoft.com/office/drawing/2010/main">
+        <mc:Choice Requires="a14">
+          <p:sp>
+            <p:nvSpPr>
+              <p:cNvPr id="2" name="Marcador de contenido 1">
+                <a:extLst>
+                  <a:ext uri="{FF2B5EF4-FFF2-40B4-BE49-F238E27FC236}">
+                    <a16:creationId xmlns:a16="http://schemas.microsoft.com/office/drawing/2014/main" id="{1E76053E-E553-4C2C-919A-CE7A30FA73F9}"/>
+                  </a:ext>
+                </a:extLst>
+              </p:cNvPr>
+              <p:cNvSpPr>
+                <a:spLocks noGrp="1"/>
+              </p:cNvSpPr>
+              <p:nvPr>
+                <p:ph idx="1"/>
+              </p:nvPr>
+            </p:nvSpPr>
+            <p:spPr>
+              <a:xfrm>
+                <a:off x="549283" y="1715304"/>
+                <a:ext cx="10628026" cy="3927423"/>
+              </a:xfrm>
+            </p:spPr>
+            <p:txBody>
+              <a:bodyPr>
+                <a:noAutofit/>
+              </a:bodyPr>
+              <a:lstStyle/>
+              <a:p>
+                <a:pPr algn="just"/>
+                <a:r>
+                  <a:rPr lang="en-GB" sz="2000" dirty="0">
+                    <a:latin typeface="Century Gothic" panose="020B0502020202020204" pitchFamily="34" charset="0"/>
+                    <a:ea typeface="Times New Roman" panose="02020603050405020304" pitchFamily="18" charset="0"/>
+                  </a:rPr>
+                  <a:t>The shares available to international investors is a residue between the total shares issued and the shares demanded by households</a:t>
+                </a:r>
+                <a:endParaRPr lang="en-GB" sz="2000" dirty="0">
+                  <a:latin typeface="Century Gothic" panose="020B0502020202020204" pitchFamily="34" charset="0"/>
+                </a:endParaRPr>
+              </a:p>
+              <a:p>
+                <a:pPr marL="0" indent="0" algn="just">
+                  <a:lnSpc>
+                    <a:spcPct val="107000"/>
+                  </a:lnSpc>
+                  <a:spcAft>
+                    <a:spcPts val="800"/>
+                  </a:spcAft>
+                  <a:buNone/>
+                </a:pPr>
+                <a:endParaRPr lang="es-CO" sz="1800" dirty="0">
+                  <a:effectLst/>
+                  <a:latin typeface="Calibri" panose="020F0502020204030204" pitchFamily="34" charset="0"/>
+                  <a:ea typeface="Calibri" panose="020F0502020204030204" pitchFamily="34" charset="0"/>
+                  <a:cs typeface="Times New Roman" panose="02020603050405020304" pitchFamily="18" charset="0"/>
+                </a:endParaRPr>
+              </a:p>
+              <a:p>
+                <a:pPr marL="0" indent="0" algn="just">
+                  <a:buNone/>
+                </a:pPr>
+                <a14:m>
+                  <m:oMathPara xmlns:m="http://schemas.openxmlformats.org/officeDocument/2006/math">
+                    <m:oMathParaPr>
+                      <m:jc m:val="centerGroup"/>
+                    </m:oMathParaPr>
+                    <m:oMath xmlns:m="http://schemas.openxmlformats.org/officeDocument/2006/math">
+                      <m:sSubSup>
+                        <m:sSubSupPr>
+                          <m:ctrlPr>
+                            <a:rPr lang="es-CO" sz="1800" i="1">
+                              <a:latin typeface="Cambria Math" panose="02040503050406030204" pitchFamily="18" charset="0"/>
+                              <a:ea typeface="Cambria Math" panose="02040503050406030204" pitchFamily="18" charset="0"/>
+                            </a:rPr>
+                          </m:ctrlPr>
+                        </m:sSubSupPr>
+                        <m:e>
+                          <m:acc>
+                            <m:accPr>
+                              <m:chr m:val="̇"/>
+                              <m:ctrlPr>
+                                <a:rPr lang="es-CO" sz="1800" i="1">
+                                  <a:latin typeface="Cambria Math" panose="02040503050406030204" pitchFamily="18" charset="0"/>
+                                  <a:ea typeface="Cambria Math" panose="02040503050406030204" pitchFamily="18" charset="0"/>
+                                </a:rPr>
+                              </m:ctrlPr>
+                            </m:accPr>
+                            <m:e>
+                              <m:r>
+                                <a:rPr lang="es-CO" sz="1800" i="1">
+                                  <a:latin typeface="Cambria Math" panose="02040503050406030204" pitchFamily="18" charset="0"/>
+                                  <a:ea typeface="Cambria Math" panose="02040503050406030204" pitchFamily="18" charset="0"/>
+                                </a:rPr>
+                                <m:t>𝐸𝑄</m:t>
+                              </m:r>
+                            </m:e>
+                          </m:acc>
+                        </m:e>
+                        <m:sub>
+                          <m:r>
+                            <a:rPr lang="es-CO" sz="1800" i="1">
+                              <a:latin typeface="Cambria Math" panose="02040503050406030204" pitchFamily="18" charset="0"/>
+                              <a:ea typeface="Cambria Math" panose="02040503050406030204" pitchFamily="18" charset="0"/>
+                            </a:rPr>
+                            <m:t>𝐹</m:t>
+                          </m:r>
+                        </m:sub>
+                        <m:sup>
+                          <m:r>
+                            <a:rPr lang="es-ES" sz="1800" b="0" i="1" smtClean="0">
+                              <a:latin typeface="Cambria Math" panose="02040503050406030204" pitchFamily="18" charset="0"/>
+                              <a:ea typeface="Cambria Math" panose="02040503050406030204" pitchFamily="18" charset="0"/>
+                            </a:rPr>
+                            <m:t>𝑅𝑂𝑊</m:t>
+                          </m:r>
+                          <m:r>
+                            <a:rPr lang="es-ES" sz="1800" b="0" i="1" smtClean="0">
+                              <a:latin typeface="Cambria Math" panose="02040503050406030204" pitchFamily="18" charset="0"/>
+                              <a:ea typeface="Cambria Math" panose="02040503050406030204" pitchFamily="18" charset="0"/>
+                            </a:rPr>
+                            <m:t>, </m:t>
+                          </m:r>
+                          <m:r>
+                            <a:rPr lang="es-ES" sz="1800" b="0" i="1" smtClean="0">
+                              <a:latin typeface="Cambria Math" panose="02040503050406030204" pitchFamily="18" charset="0"/>
+                              <a:ea typeface="Cambria Math" panose="02040503050406030204" pitchFamily="18" charset="0"/>
+                            </a:rPr>
+                            <m:t>𝑠</m:t>
+                          </m:r>
+                        </m:sup>
+                      </m:sSubSup>
+                      <m:r>
+                        <a:rPr lang="en-GB" sz="1800" i="1">
+                          <a:latin typeface="Cambria Math" panose="02040503050406030204" pitchFamily="18" charset="0"/>
+                          <a:ea typeface="Cambria Math" panose="02040503050406030204" pitchFamily="18" charset="0"/>
+                        </a:rPr>
+                        <m:t>=</m:t>
+                      </m:r>
+                      <m:acc>
+                        <m:accPr>
+                          <m:chr m:val="̇"/>
+                          <m:ctrlPr>
+                            <a:rPr lang="es-CO" sz="1800" i="1">
+                              <a:latin typeface="Cambria Math" panose="02040503050406030204" pitchFamily="18" charset="0"/>
+                              <a:ea typeface="Cambria Math" panose="02040503050406030204" pitchFamily="18" charset="0"/>
+                            </a:rPr>
+                          </m:ctrlPr>
+                        </m:accPr>
+                        <m:e>
+                          <m:sSubSup>
+                            <m:sSubSupPr>
+                              <m:ctrlPr>
+                                <a:rPr lang="en-GB" sz="1800" i="1">
+                                  <a:latin typeface="Cambria Math" panose="02040503050406030204" pitchFamily="18" charset="0"/>
+                                  <a:ea typeface="Cambria Math" panose="02040503050406030204" pitchFamily="18" charset="0"/>
+                                </a:rPr>
+                              </m:ctrlPr>
+                            </m:sSubSupPr>
+                            <m:e>
+                              <m:r>
+                                <a:rPr lang="en-GB" sz="1800" i="1">
+                                  <a:latin typeface="Cambria Math" panose="02040503050406030204" pitchFamily="18" charset="0"/>
+                                  <a:ea typeface="Cambria Math" panose="02040503050406030204" pitchFamily="18" charset="0"/>
+                                </a:rPr>
+                                <m:t>𝐸𝑄</m:t>
+                              </m:r>
+                            </m:e>
+                            <m:sub>
+                              <m:r>
+                                <a:rPr lang="en-GB" sz="1800" i="1">
+                                  <a:latin typeface="Cambria Math" panose="02040503050406030204" pitchFamily="18" charset="0"/>
+                                  <a:ea typeface="Cambria Math" panose="02040503050406030204" pitchFamily="18" charset="0"/>
+                                </a:rPr>
+                                <m:t>𝐹</m:t>
+                              </m:r>
+                            </m:sub>
+                            <m:sup>
+                              <m:r>
+                                <a:rPr lang="es-ES" sz="1800" b="0" i="1" smtClean="0">
+                                  <a:latin typeface="Cambria Math" panose="02040503050406030204" pitchFamily="18" charset="0"/>
+                                  <a:ea typeface="Cambria Math" panose="02040503050406030204" pitchFamily="18" charset="0"/>
+                                </a:rPr>
+                                <m:t>𝑠</m:t>
+                              </m:r>
+                            </m:sup>
+                          </m:sSubSup>
+                        </m:e>
+                      </m:acc>
+                      <m:r>
+                        <a:rPr lang="en-GB" sz="1800" i="1">
+                          <a:latin typeface="Cambria Math" panose="02040503050406030204" pitchFamily="18" charset="0"/>
+                          <a:ea typeface="Cambria Math" panose="02040503050406030204" pitchFamily="18" charset="0"/>
+                        </a:rPr>
+                        <m:t>− </m:t>
+                      </m:r>
+                      <m:sSubSup>
+                        <m:sSubSupPr>
+                          <m:ctrlPr>
+                            <a:rPr lang="es-CO" sz="1800" i="1">
+                              <a:latin typeface="Cambria Math" panose="02040503050406030204" pitchFamily="18" charset="0"/>
+                              <a:ea typeface="Cambria Math" panose="02040503050406030204" pitchFamily="18" charset="0"/>
+                            </a:rPr>
+                          </m:ctrlPr>
+                        </m:sSubSupPr>
+                        <m:e>
+                          <m:acc>
+                            <m:accPr>
+                              <m:chr m:val="̇"/>
+                              <m:ctrlPr>
+                                <a:rPr lang="es-CO" sz="1800" i="1">
+                                  <a:latin typeface="Cambria Math" panose="02040503050406030204" pitchFamily="18" charset="0"/>
+                                  <a:ea typeface="Cambria Math" panose="02040503050406030204" pitchFamily="18" charset="0"/>
+                                </a:rPr>
+                              </m:ctrlPr>
+                            </m:accPr>
+                            <m:e>
+                              <m:r>
+                                <a:rPr lang="en-GB" sz="1800" i="1">
+                                  <a:latin typeface="Cambria Math" panose="02040503050406030204" pitchFamily="18" charset="0"/>
+                                  <a:ea typeface="Cambria Math" panose="02040503050406030204" pitchFamily="18" charset="0"/>
+                                </a:rPr>
+                                <m:t>𝐸𝑄</m:t>
+                              </m:r>
+                            </m:e>
+                          </m:acc>
+                        </m:e>
+                        <m:sub>
+                          <m:r>
+                            <a:rPr lang="en-GB" sz="1800" i="1">
+                              <a:latin typeface="Cambria Math" panose="02040503050406030204" pitchFamily="18" charset="0"/>
+                              <a:ea typeface="Cambria Math" panose="02040503050406030204" pitchFamily="18" charset="0"/>
+                            </a:rPr>
+                            <m:t>𝐹</m:t>
+                          </m:r>
+                        </m:sub>
+                        <m:sup>
+                          <m:r>
+                            <a:rPr lang="en-GB" sz="1800" i="1">
+                              <a:latin typeface="Cambria Math" panose="02040503050406030204" pitchFamily="18" charset="0"/>
+                              <a:ea typeface="Cambria Math" panose="02040503050406030204" pitchFamily="18" charset="0"/>
+                            </a:rPr>
+                            <m:t>𝐻</m:t>
+                          </m:r>
+                          <m:r>
+                            <a:rPr lang="en-GB" sz="1800" i="1">
+                              <a:latin typeface="Cambria Math" panose="02040503050406030204" pitchFamily="18" charset="0"/>
+                              <a:ea typeface="Cambria Math" panose="02040503050406030204" pitchFamily="18" charset="0"/>
+                            </a:rPr>
+                            <m:t>,</m:t>
+                          </m:r>
+                          <m:r>
+                            <a:rPr lang="en-GB" sz="1800" i="1">
+                              <a:latin typeface="Cambria Math" panose="02040503050406030204" pitchFamily="18" charset="0"/>
+                              <a:ea typeface="Cambria Math" panose="02040503050406030204" pitchFamily="18" charset="0"/>
+                            </a:rPr>
+                            <m:t>𝑑</m:t>
+                          </m:r>
+                        </m:sup>
+                      </m:sSubSup>
+                      <m:r>
+                        <a:rPr lang="es-ES" sz="1800" b="0" i="1" smtClean="0">
+                          <a:latin typeface="Cambria Math" panose="02040503050406030204" pitchFamily="18" charset="0"/>
+                          <a:ea typeface="Cambria Math" panose="02040503050406030204" pitchFamily="18" charset="0"/>
+                        </a:rPr>
+                        <m:t>(19)</m:t>
+                      </m:r>
+                    </m:oMath>
+                  </m:oMathPara>
+                </a14:m>
+                <a:endParaRPr lang="en-GB" sz="2000" dirty="0">
+                  <a:latin typeface="Century Gothic" panose="020B0502020202020204" pitchFamily="34" charset="0"/>
+                </a:endParaRPr>
+              </a:p>
+              <a:p>
+                <a:pPr marL="0" indent="0" algn="just">
+                  <a:buNone/>
+                </a:pPr>
+                <a:endParaRPr lang="en-GB" sz="2000" dirty="0">
+                  <a:latin typeface="Century Gothic" panose="020B0502020202020204" pitchFamily="34" charset="0"/>
+                </a:endParaRPr>
+              </a:p>
+              <a:p>
+                <a:pPr algn="just"/>
+                <a:r>
+                  <a:rPr lang="en-GB" sz="2000" dirty="0">
+                    <a:latin typeface="Century Gothic" panose="020B0502020202020204" pitchFamily="34" charset="0"/>
+                  </a:rPr>
+                  <a:t>The participation of foreign investors in the total number of shares of the firms derives as follows</a:t>
+                </a:r>
+              </a:p>
+              <a:p>
+                <a:pPr algn="just"/>
+                <a:endParaRPr lang="en-GB" sz="2000" dirty="0">
+                  <a:latin typeface="Century Gothic" panose="020B0502020202020204" pitchFamily="34" charset="0"/>
+                </a:endParaRPr>
+              </a:p>
+              <a:p>
+                <a:pPr marL="0" indent="0" algn="just">
+                  <a:buNone/>
+                </a:pPr>
+                <a14:m>
+                  <m:oMathPara xmlns:m="http://schemas.openxmlformats.org/officeDocument/2006/math">
+                    <m:oMathParaPr>
+                      <m:jc m:val="centerGroup"/>
+                    </m:oMathParaPr>
+                    <m:oMath xmlns:m="http://schemas.openxmlformats.org/officeDocument/2006/math">
+                      <m:r>
+                        <a:rPr lang="es-ES" sz="1800" b="0" i="1" smtClean="0">
+                          <a:latin typeface="Cambria Math" panose="02040503050406030204" pitchFamily="18" charset="0"/>
+                          <a:ea typeface="Cambria Math" panose="02040503050406030204" pitchFamily="18" charset="0"/>
+                        </a:rPr>
+                        <m:t>𝜚</m:t>
+                      </m:r>
+                      <m:r>
+                        <a:rPr lang="es-ES" sz="1800" b="0" i="1" smtClean="0">
+                          <a:latin typeface="Cambria Math" panose="02040503050406030204" pitchFamily="18" charset="0"/>
+                          <a:ea typeface="Cambria Math" panose="02040503050406030204" pitchFamily="18" charset="0"/>
+                        </a:rPr>
+                        <m:t>=</m:t>
+                      </m:r>
+                      <m:f>
+                        <m:fPr>
+                          <m:ctrlPr>
+                            <a:rPr lang="en-GB" sz="1800" i="1" smtClean="0">
+                              <a:latin typeface="Cambria Math" panose="02040503050406030204" pitchFamily="18" charset="0"/>
+                              <a:ea typeface="Cambria Math" panose="02040503050406030204" pitchFamily="18" charset="0"/>
+                            </a:rPr>
+                          </m:ctrlPr>
+                        </m:fPr>
+                        <m:num>
+                          <m:r>
+                            <a:rPr lang="es-ES" sz="1800" b="0" i="1" smtClean="0">
+                              <a:latin typeface="Cambria Math" panose="02040503050406030204" pitchFamily="18" charset="0"/>
+                              <a:ea typeface="Cambria Math" panose="02040503050406030204" pitchFamily="18" charset="0"/>
+                            </a:rPr>
+                            <m:t>𝐸</m:t>
+                          </m:r>
+                          <m:sSubSup>
+                            <m:sSubSupPr>
+                              <m:ctrlPr>
+                                <a:rPr lang="es-ES" sz="1800" b="0" i="1" smtClean="0">
+                                  <a:latin typeface="Cambria Math" panose="02040503050406030204" pitchFamily="18" charset="0"/>
+                                  <a:ea typeface="Cambria Math" panose="02040503050406030204" pitchFamily="18" charset="0"/>
+                                </a:rPr>
+                              </m:ctrlPr>
+                            </m:sSubSupPr>
+                            <m:e>
+                              <m:r>
+                                <a:rPr lang="es-ES" sz="1800" b="0" i="1" smtClean="0">
+                                  <a:latin typeface="Cambria Math" panose="02040503050406030204" pitchFamily="18" charset="0"/>
+                                  <a:ea typeface="Cambria Math" panose="02040503050406030204" pitchFamily="18" charset="0"/>
+                                </a:rPr>
+                                <m:t>𝑄</m:t>
+                              </m:r>
+                            </m:e>
+                            <m:sub>
+                              <m:r>
+                                <a:rPr lang="es-ES" sz="1800" b="0" i="1" smtClean="0">
+                                  <a:latin typeface="Cambria Math" panose="02040503050406030204" pitchFamily="18" charset="0"/>
+                                  <a:ea typeface="Cambria Math" panose="02040503050406030204" pitchFamily="18" charset="0"/>
+                                </a:rPr>
+                                <m:t>𝐹</m:t>
+                              </m:r>
+                            </m:sub>
+                            <m:sup>
+                              <m:r>
+                                <a:rPr lang="es-ES" sz="1800" b="0" i="1" smtClean="0">
+                                  <a:latin typeface="Cambria Math" panose="02040503050406030204" pitchFamily="18" charset="0"/>
+                                  <a:ea typeface="Cambria Math" panose="02040503050406030204" pitchFamily="18" charset="0"/>
+                                </a:rPr>
+                                <m:t>𝑅𝑂𝑊</m:t>
+                              </m:r>
+                            </m:sup>
+                          </m:sSubSup>
+                        </m:num>
+                        <m:den>
+                          <m:r>
+                            <a:rPr lang="es-ES" sz="1800" b="0" i="1" smtClean="0">
+                              <a:latin typeface="Cambria Math" panose="02040503050406030204" pitchFamily="18" charset="0"/>
+                              <a:ea typeface="Cambria Math" panose="02040503050406030204" pitchFamily="18" charset="0"/>
+                            </a:rPr>
+                            <m:t>𝐸</m:t>
+                          </m:r>
+                          <m:sSub>
+                            <m:sSubPr>
+                              <m:ctrlPr>
+                                <a:rPr lang="es-ES" sz="1800" b="0" i="1" smtClean="0">
+                                  <a:latin typeface="Cambria Math" panose="02040503050406030204" pitchFamily="18" charset="0"/>
+                                  <a:ea typeface="Cambria Math" panose="02040503050406030204" pitchFamily="18" charset="0"/>
+                                </a:rPr>
+                              </m:ctrlPr>
+                            </m:sSubPr>
+                            <m:e>
+                              <m:r>
+                                <a:rPr lang="es-ES" sz="1800" b="0" i="1" smtClean="0">
+                                  <a:latin typeface="Cambria Math" panose="02040503050406030204" pitchFamily="18" charset="0"/>
+                                  <a:ea typeface="Cambria Math" panose="02040503050406030204" pitchFamily="18" charset="0"/>
+                                </a:rPr>
+                                <m:t>𝑄</m:t>
+                              </m:r>
+                            </m:e>
+                            <m:sub>
+                              <m:r>
+                                <a:rPr lang="es-ES" sz="1800" b="0" i="1" smtClean="0">
+                                  <a:latin typeface="Cambria Math" panose="02040503050406030204" pitchFamily="18" charset="0"/>
+                                  <a:ea typeface="Cambria Math" panose="02040503050406030204" pitchFamily="18" charset="0"/>
+                                </a:rPr>
+                                <m:t>𝐹</m:t>
+                              </m:r>
+                            </m:sub>
+                          </m:sSub>
+                        </m:den>
+                      </m:f>
+                      <m:r>
+                        <a:rPr lang="es-ES" sz="1800" b="0" i="1" smtClean="0">
+                          <a:latin typeface="Cambria Math" panose="02040503050406030204" pitchFamily="18" charset="0"/>
+                          <a:ea typeface="Cambria Math" panose="02040503050406030204" pitchFamily="18" charset="0"/>
+                        </a:rPr>
+                        <m:t>(20)</m:t>
+                      </m:r>
+                    </m:oMath>
+                  </m:oMathPara>
+                </a14:m>
+                <a:endParaRPr lang="en-GB" sz="1800" dirty="0">
+                  <a:latin typeface="Century Gothic" panose="020B0502020202020204" pitchFamily="34" charset="0"/>
+                </a:endParaRPr>
+              </a:p>
+            </p:txBody>
+          </p:sp>
+        </mc:Choice>
+        <mc:Fallback xmlns="">
+          <p:sp>
+            <p:nvSpPr>
+              <p:cNvPr id="2" name="Marcador de contenido 1">
+                <a:extLst>
+                  <a:ext uri="{FF2B5EF4-FFF2-40B4-BE49-F238E27FC236}">
+                    <a16:creationId xmlns:a16="http://schemas.microsoft.com/office/drawing/2014/main" id="{1E76053E-E553-4C2C-919A-CE7A30FA73F9}"/>
+                  </a:ext>
+                </a:extLst>
+              </p:cNvPr>
+              <p:cNvSpPr>
+                <a:spLocks noGrp="1" noRot="1" noChangeAspect="1" noMove="1" noResize="1" noEditPoints="1" noAdjustHandles="1" noChangeArrowheads="1" noChangeShapeType="1" noTextEdit="1"/>
+              </p:cNvSpPr>
+              <p:nvPr>
+                <p:ph idx="1"/>
+              </p:nvPr>
+            </p:nvSpPr>
+            <p:spPr>
+              <a:xfrm>
+                <a:off x="549283" y="1715304"/>
+                <a:ext cx="10628026" cy="3927423"/>
+              </a:xfrm>
+              <a:blipFill>
+                <a:blip r:embed="rId2"/>
+                <a:stretch>
+                  <a:fillRect l="-477" t="-643" r="-1193"/>
+                </a:stretch>
+              </a:blipFill>
+            </p:spPr>
+            <p:txBody>
+              <a:bodyPr/>
+              <a:lstStyle/>
+              <a:p>
+                <a:r>
+                  <a:rPr lang="es-CO">
+                    <a:noFill/>
+                  </a:rPr>
+                  <a:t> </a:t>
+                </a:r>
+              </a:p>
+            </p:txBody>
+          </p:sp>
+        </mc:Fallback>
+      </mc:AlternateContent>
+      <p:sp>
+        <p:nvSpPr>
+          <p:cNvPr id="3" name="Título 2">
+            <a:extLst>
+              <a:ext uri="{FF2B5EF4-FFF2-40B4-BE49-F238E27FC236}">
+                <a16:creationId xmlns:a16="http://schemas.microsoft.com/office/drawing/2014/main" id="{5DA68AA8-71CC-44C3-BE34-4520548865CD}"/>
+              </a:ext>
+            </a:extLst>
+          </p:cNvPr>
+          <p:cNvSpPr>
+            <a:spLocks noGrp="1"/>
+          </p:cNvSpPr>
+          <p:nvPr>
+            <p:ph type="title"/>
+          </p:nvPr>
+        </p:nvSpPr>
+        <p:spPr>
+          <a:xfrm>
+            <a:off x="687841" y="457517"/>
+            <a:ext cx="7694645" cy="979127"/>
+          </a:xfrm>
+        </p:spPr>
+        <p:txBody>
+          <a:bodyPr>
+            <a:noAutofit/>
+          </a:bodyPr>
+          <a:lstStyle/>
+          <a:p>
+            <a:pPr algn="l"/>
+            <a:r>
+              <a:rPr lang="es-CO" b="1" dirty="0">
+                <a:latin typeface="Century Gothic" panose="020B0502020202020204" pitchFamily="34" charset="0"/>
+              </a:rPr>
+              <a:t>Equities and ownership structure </a:t>
+            </a:r>
+          </a:p>
+        </p:txBody>
+      </p:sp>
+    </p:spTree>
+    <p:extLst>
+      <p:ext uri="{BB962C8B-B14F-4D97-AF65-F5344CB8AC3E}">
+        <p14:creationId xmlns:p14="http://schemas.microsoft.com/office/powerpoint/2010/main" val="2280684295"/>
+      </p:ext>
+    </p:extLst>
+  </p:cSld>
+  <p:clrMapOvr>
+    <a:masterClrMapping/>
+  </p:clrMapOvr>
+</p:sld>
+</file>
+
+<file path=ppt/slides/slide13.xml><?xml version="1.0" encoding="utf-8"?>
+<p:sld xmlns:a="http://schemas.openxmlformats.org/drawingml/2006/main" xmlns:r="http://schemas.openxmlformats.org/officeDocument/2006/relationships" xmlns:p="http://schemas.openxmlformats.org/presentationml/2006/main">
+  <p:cSld>
+    <p:spTree>
+      <p:nvGrpSpPr>
+        <p:cNvPr id="1" name=""/>
+        <p:cNvGrpSpPr/>
+        <p:nvPr/>
+      </p:nvGrpSpPr>
+      <p:grpSpPr>
+        <a:xfrm>
+          <a:off x="0" y="0"/>
+          <a:ext cx="0" cy="0"/>
+          <a:chOff x="0" y="0"/>
+          <a:chExt cx="0" cy="0"/>
+        </a:xfrm>
+      </p:grpSpPr>
+      <mc:AlternateContent xmlns:mc="http://schemas.openxmlformats.org/markup-compatibility/2006" xmlns:a14="http://schemas.microsoft.com/office/drawing/2010/main">
+        <mc:Choice Requires="a14">
+          <p:sp>
+            <p:nvSpPr>
+              <p:cNvPr id="2" name="Marcador de contenido 1">
+                <a:extLst>
+                  <a:ext uri="{FF2B5EF4-FFF2-40B4-BE49-F238E27FC236}">
+                    <a16:creationId xmlns:a16="http://schemas.microsoft.com/office/drawing/2014/main" id="{1E76053E-E553-4C2C-919A-CE7A30FA73F9}"/>
+                  </a:ext>
+                </a:extLst>
+              </p:cNvPr>
+              <p:cNvSpPr>
+                <a:spLocks noGrp="1"/>
+              </p:cNvSpPr>
+              <p:nvPr>
+                <p:ph idx="1"/>
+              </p:nvPr>
+            </p:nvSpPr>
+            <p:spPr>
+              <a:xfrm>
+                <a:off x="687841" y="1832870"/>
+                <a:ext cx="10628026" cy="3927423"/>
+              </a:xfrm>
+            </p:spPr>
+            <p:txBody>
+              <a:bodyPr>
+                <a:noAutofit/>
+              </a:bodyPr>
+              <a:lstStyle/>
+              <a:p>
+                <a:pPr algn="just"/>
+                <a:r>
+                  <a:rPr lang="en-GB" sz="2000" dirty="0">
+                    <a:latin typeface="Century Gothic" panose="020B0502020202020204" pitchFamily="34" charset="0"/>
+                    <a:ea typeface="Times New Roman" panose="02020603050405020304" pitchFamily="18" charset="0"/>
+                  </a:rPr>
+                  <a:t>The demand for shares of households as a proportion of their liquid wealth plus loans has an autonomous component, in addition it is a function of the interest rate on deposits and the interest rate on public bonds</a:t>
+                </a:r>
+              </a:p>
+              <a:p>
+                <a:pPr marL="0" indent="0" algn="just">
+                  <a:buNone/>
+                </a:pPr>
+                <a:endParaRPr lang="es-ES" sz="1800" i="1" dirty="0"/>
+              </a:p>
+              <a:p>
+                <a:pPr marL="0" indent="0" algn="just">
+                  <a:buNone/>
+                </a:pPr>
+                <a:endParaRPr lang="es-ES" sz="1800" i="1" dirty="0"/>
+              </a:p>
+              <a:p>
+                <a:pPr marL="0" indent="0" algn="just">
+                  <a:buNone/>
+                </a:pPr>
+                <a:endParaRPr lang="es-ES" sz="1800" i="1" dirty="0"/>
+              </a:p>
+              <a:p>
+                <a:pPr marL="0" indent="0" algn="just">
+                  <a:buNone/>
+                </a:pPr>
+                <a14:m>
+                  <m:oMathPara xmlns:m="http://schemas.openxmlformats.org/officeDocument/2006/math">
+                    <m:oMathParaPr>
+                      <m:jc m:val="centerGroup"/>
+                    </m:oMathParaPr>
+                    <m:oMath xmlns:m="http://schemas.openxmlformats.org/officeDocument/2006/math">
+                      <m:f>
+                        <m:fPr>
+                          <m:ctrlPr>
+                            <a:rPr lang="es-CO" sz="1800" i="1">
+                              <a:latin typeface="Cambria Math" panose="02040503050406030204" pitchFamily="18" charset="0"/>
+                            </a:rPr>
+                          </m:ctrlPr>
+                        </m:fPr>
+                        <m:num>
+                          <m:sSub>
+                            <m:sSubPr>
+                              <m:ctrlPr>
+                                <a:rPr lang="es-ES" sz="1800" b="0" i="1" smtClean="0">
+                                  <a:latin typeface="Cambria Math" panose="02040503050406030204" pitchFamily="18" charset="0"/>
+                                </a:rPr>
+                              </m:ctrlPr>
+                            </m:sSubPr>
+                            <m:e>
+                              <m:r>
+                                <a:rPr lang="es-ES" sz="1800" b="0" i="1" smtClean="0">
+                                  <a:latin typeface="Cambria Math" panose="02040503050406030204" pitchFamily="18" charset="0"/>
+                                </a:rPr>
+                                <m:t>𝑃</m:t>
+                              </m:r>
+                            </m:e>
+                            <m:sub>
+                              <m:r>
+                                <a:rPr lang="es-ES" sz="1800" b="0" i="1" smtClean="0">
+                                  <a:latin typeface="Cambria Math" panose="02040503050406030204" pitchFamily="18" charset="0"/>
+                                </a:rPr>
+                                <m:t>𝐸</m:t>
+                              </m:r>
+                            </m:sub>
+                          </m:sSub>
+                          <m:sSubSup>
+                            <m:sSubSupPr>
+                              <m:ctrlPr>
+                                <a:rPr lang="es-CO" sz="1800" i="1">
+                                  <a:latin typeface="Cambria Math" panose="02040503050406030204" pitchFamily="18" charset="0"/>
+                                </a:rPr>
+                              </m:ctrlPr>
+                            </m:sSubSupPr>
+                            <m:e>
+                              <m:acc>
+                                <m:accPr>
+                                  <m:chr m:val="̇"/>
+                                  <m:ctrlPr>
+                                    <a:rPr lang="es-CO" sz="1800" i="1">
+                                      <a:latin typeface="Cambria Math" panose="02040503050406030204" pitchFamily="18" charset="0"/>
+                                    </a:rPr>
+                                  </m:ctrlPr>
+                                </m:accPr>
+                                <m:e>
+                                  <m:r>
+                                    <a:rPr lang="en-GB" sz="1800" i="1">
+                                      <a:latin typeface="Cambria Math" panose="02040503050406030204" pitchFamily="18" charset="0"/>
+                                    </a:rPr>
+                                    <m:t>𝐸𝑄</m:t>
+                                  </m:r>
+                                </m:e>
+                              </m:acc>
+                            </m:e>
+                            <m:sub>
+                              <m:r>
+                                <a:rPr lang="en-GB" sz="1800" i="1">
+                                  <a:latin typeface="Cambria Math" panose="02040503050406030204" pitchFamily="18" charset="0"/>
+                                </a:rPr>
+                                <m:t>𝐹</m:t>
+                              </m:r>
+                            </m:sub>
+                            <m:sup>
+                              <m:r>
+                                <a:rPr lang="en-GB" sz="1800" i="1">
+                                  <a:latin typeface="Cambria Math" panose="02040503050406030204" pitchFamily="18" charset="0"/>
+                                </a:rPr>
+                                <m:t>𝐻</m:t>
+                              </m:r>
+                              <m:r>
+                                <a:rPr lang="en-GB" sz="1800" i="1">
+                                  <a:latin typeface="Cambria Math" panose="02040503050406030204" pitchFamily="18" charset="0"/>
+                                </a:rPr>
+                                <m:t>,</m:t>
+                              </m:r>
+                              <m:r>
+                                <a:rPr lang="en-GB" sz="1800" i="1">
+                                  <a:latin typeface="Cambria Math" panose="02040503050406030204" pitchFamily="18" charset="0"/>
+                                </a:rPr>
+                                <m:t>𝑑</m:t>
+                              </m:r>
+                            </m:sup>
+                          </m:sSubSup>
+                        </m:num>
+                        <m:den>
+                          <m:sSub>
+                            <m:sSubPr>
+                              <m:ctrlPr>
+                                <a:rPr lang="es-CO" sz="1800" i="1">
+                                  <a:latin typeface="Cambria Math" panose="02040503050406030204" pitchFamily="18" charset="0"/>
+                                </a:rPr>
+                              </m:ctrlPr>
+                            </m:sSubPr>
+                            <m:e>
+                              <m:r>
+                                <a:rPr lang="en-GB" sz="1800" i="1">
+                                  <a:latin typeface="Cambria Math" panose="02040503050406030204" pitchFamily="18" charset="0"/>
+                                </a:rPr>
+                                <m:t>(</m:t>
+                              </m:r>
+                              <m:r>
+                                <a:rPr lang="es-ES" sz="1800" b="0" i="1" smtClean="0">
+                                  <a:latin typeface="Cambria Math" panose="02040503050406030204" pitchFamily="18" charset="0"/>
+                                </a:rPr>
+                                <m:t>𝑊</m:t>
+                              </m:r>
+                            </m:e>
+                            <m:sub>
+                              <m:r>
+                                <a:rPr lang="es-ES" sz="1800" b="0" i="1" smtClean="0">
+                                  <a:latin typeface="Cambria Math" panose="02040503050406030204" pitchFamily="18" charset="0"/>
+                                </a:rPr>
+                                <m:t>𝐻</m:t>
+                              </m:r>
+                            </m:sub>
+                          </m:sSub>
+                          <m:r>
+                            <a:rPr lang="en-GB" sz="1800" i="1">
+                              <a:latin typeface="Cambria Math" panose="02040503050406030204" pitchFamily="18" charset="0"/>
+                            </a:rPr>
+                            <m:t>+</m:t>
+                          </m:r>
+                          <m:sSub>
+                            <m:sSubPr>
+                              <m:ctrlPr>
+                                <a:rPr lang="es-CO" sz="1800" i="1">
+                                  <a:latin typeface="Cambria Math" panose="02040503050406030204" pitchFamily="18" charset="0"/>
+                                </a:rPr>
+                              </m:ctrlPr>
+                            </m:sSubPr>
+                            <m:e>
+                              <m:r>
+                                <a:rPr lang="en-GB" sz="1800" i="1">
+                                  <a:latin typeface="Cambria Math" panose="02040503050406030204" pitchFamily="18" charset="0"/>
+                                </a:rPr>
+                                <m:t>𝐿</m:t>
+                              </m:r>
+                            </m:e>
+                            <m:sub>
+                              <m:r>
+                                <a:rPr lang="es-ES" sz="1800" b="0" i="1" smtClean="0">
+                                  <a:latin typeface="Cambria Math" panose="02040503050406030204" pitchFamily="18" charset="0"/>
+                                </a:rPr>
+                                <m:t>𝐻</m:t>
+                              </m:r>
+                            </m:sub>
+                          </m:sSub>
+                          <m:r>
+                            <a:rPr lang="en-GB" sz="1800" i="1">
+                              <a:latin typeface="Cambria Math" panose="02040503050406030204" pitchFamily="18" charset="0"/>
+                            </a:rPr>
+                            <m:t>)</m:t>
+                          </m:r>
+                        </m:den>
+                      </m:f>
+                      <m:r>
+                        <a:rPr lang="en-GB" sz="1800" i="1">
+                          <a:latin typeface="Cambria Math" panose="02040503050406030204" pitchFamily="18" charset="0"/>
+                        </a:rPr>
+                        <m:t>=(</m:t>
+                      </m:r>
+                      <m:sSub>
+                        <m:sSubPr>
+                          <m:ctrlPr>
+                            <a:rPr lang="es-CO" sz="1800" i="1">
+                              <a:latin typeface="Cambria Math" panose="02040503050406030204" pitchFamily="18" charset="0"/>
+                            </a:rPr>
+                          </m:ctrlPr>
+                        </m:sSubPr>
+                        <m:e>
+                          <m:r>
+                            <a:rPr lang="en-GB" sz="1800" i="1">
+                              <a:latin typeface="Cambria Math" panose="02040503050406030204" pitchFamily="18" charset="0"/>
+                            </a:rPr>
+                            <m:t>𝜕</m:t>
+                          </m:r>
+                        </m:e>
+                        <m:sub>
+                          <m:r>
+                            <a:rPr lang="en-GB" sz="1800" i="1">
+                              <a:latin typeface="Cambria Math" panose="02040503050406030204" pitchFamily="18" charset="0"/>
+                            </a:rPr>
+                            <m:t>0</m:t>
+                          </m:r>
+                        </m:sub>
+                      </m:sSub>
+                      <m:r>
+                        <a:rPr lang="en-GB" sz="1800" i="1">
+                          <a:latin typeface="Cambria Math" panose="02040503050406030204" pitchFamily="18" charset="0"/>
+                        </a:rPr>
+                        <m:t>−</m:t>
+                      </m:r>
+                      <m:sSub>
+                        <m:sSubPr>
+                          <m:ctrlPr>
+                            <a:rPr lang="es-CO" sz="1800" i="1">
+                              <a:latin typeface="Cambria Math" panose="02040503050406030204" pitchFamily="18" charset="0"/>
+                            </a:rPr>
+                          </m:ctrlPr>
+                        </m:sSubPr>
+                        <m:e>
+                          <m:r>
+                            <a:rPr lang="en-GB" sz="1800" i="1">
+                              <a:latin typeface="Cambria Math" panose="02040503050406030204" pitchFamily="18" charset="0"/>
+                            </a:rPr>
+                            <m:t>𝜕</m:t>
+                          </m:r>
+                        </m:e>
+                        <m:sub>
+                          <m:r>
+                            <a:rPr lang="en-GB" sz="1800" i="1">
+                              <a:latin typeface="Cambria Math" panose="02040503050406030204" pitchFamily="18" charset="0"/>
+                            </a:rPr>
+                            <m:t>1</m:t>
+                          </m:r>
+                        </m:sub>
+                      </m:sSub>
+                      <m:sSup>
+                        <m:sSupPr>
+                          <m:ctrlPr>
+                            <a:rPr lang="es-ES" sz="1800" i="1">
+                              <a:latin typeface="Cambria Math" panose="02040503050406030204" pitchFamily="18" charset="0"/>
+                            </a:rPr>
+                          </m:ctrlPr>
+                        </m:sSupPr>
+                        <m:e>
+                          <m:r>
+                            <a:rPr lang="es-ES" sz="1800" b="0" i="1" smtClean="0">
+                              <a:latin typeface="Cambria Math" panose="02040503050406030204" pitchFamily="18" charset="0"/>
+                            </a:rPr>
+                            <m:t>𝑖</m:t>
+                          </m:r>
+                        </m:e>
+                        <m:sup>
+                          <m:r>
+                            <a:rPr lang="es-ES" sz="1800" b="0" i="1" smtClean="0">
+                              <a:latin typeface="Cambria Math" panose="02040503050406030204" pitchFamily="18" charset="0"/>
+                            </a:rPr>
+                            <m:t>𝐷</m:t>
+                          </m:r>
+                        </m:sup>
+                      </m:sSup>
+                      <m:r>
+                        <a:rPr lang="en-GB" sz="1800" i="1">
+                          <a:latin typeface="Cambria Math" panose="02040503050406030204" pitchFamily="18" charset="0"/>
+                        </a:rPr>
+                        <m:t>−</m:t>
+                      </m:r>
+                      <m:sSub>
+                        <m:sSubPr>
+                          <m:ctrlPr>
+                            <a:rPr lang="es-CO" sz="1800" i="1">
+                              <a:latin typeface="Cambria Math" panose="02040503050406030204" pitchFamily="18" charset="0"/>
+                            </a:rPr>
+                          </m:ctrlPr>
+                        </m:sSubPr>
+                        <m:e>
+                          <m:r>
+                            <a:rPr lang="en-GB" sz="1800" i="1">
+                              <a:latin typeface="Cambria Math" panose="02040503050406030204" pitchFamily="18" charset="0"/>
+                            </a:rPr>
+                            <m:t>𝜕</m:t>
+                          </m:r>
+                        </m:e>
+                        <m:sub>
+                          <m:r>
+                            <a:rPr lang="en-GB" sz="1800" i="1">
+                              <a:latin typeface="Cambria Math" panose="02040503050406030204" pitchFamily="18" charset="0"/>
+                            </a:rPr>
+                            <m:t>2</m:t>
+                          </m:r>
+                        </m:sub>
+                      </m:sSub>
+                      <m:sSup>
+                        <m:sSupPr>
+                          <m:ctrlPr>
+                            <a:rPr lang="es-ES" sz="1800" i="1">
+                              <a:latin typeface="Cambria Math" panose="02040503050406030204" pitchFamily="18" charset="0"/>
+                            </a:rPr>
+                          </m:ctrlPr>
+                        </m:sSupPr>
+                        <m:e>
+                          <m:r>
+                            <a:rPr lang="es-ES" sz="1800" b="0" i="1" smtClean="0">
+                              <a:latin typeface="Cambria Math" panose="02040503050406030204" pitchFamily="18" charset="0"/>
+                            </a:rPr>
+                            <m:t>𝑖</m:t>
+                          </m:r>
+                        </m:e>
+                        <m:sup>
+                          <m:r>
+                            <a:rPr lang="es-ES" sz="1800" b="0" i="1" smtClean="0">
+                              <a:latin typeface="Cambria Math" panose="02040503050406030204" pitchFamily="18" charset="0"/>
+                            </a:rPr>
+                            <m:t>𝐺</m:t>
+                          </m:r>
+                        </m:sup>
+                      </m:sSup>
+                      <m:r>
+                        <a:rPr lang="en-GB" sz="1800" i="1">
+                          <a:latin typeface="Cambria Math" panose="02040503050406030204" pitchFamily="18" charset="0"/>
+                        </a:rPr>
+                        <m:t>)</m:t>
+                      </m:r>
+                      <m:r>
+                        <a:rPr lang="es-ES" sz="1800" b="0" i="1" smtClean="0">
+                          <a:latin typeface="Cambria Math" panose="02040503050406030204" pitchFamily="18" charset="0"/>
+                          <a:ea typeface="Cambria Math" panose="02040503050406030204" pitchFamily="18" charset="0"/>
+                        </a:rPr>
+                        <m:t>(21)</m:t>
+                      </m:r>
+                    </m:oMath>
+                  </m:oMathPara>
+                </a14:m>
+                <a:endParaRPr lang="en-GB" sz="2000" dirty="0">
+                  <a:latin typeface="Century Gothic" panose="020B0502020202020204" pitchFamily="34" charset="0"/>
+                </a:endParaRPr>
+              </a:p>
+              <a:p>
+                <a:pPr marL="0" indent="0" algn="just">
+                  <a:buNone/>
+                </a:pPr>
+                <a:endParaRPr lang="en-GB" sz="2000" dirty="0">
+                  <a:latin typeface="Century Gothic" panose="020B0502020202020204" pitchFamily="34" charset="0"/>
+                </a:endParaRPr>
+              </a:p>
+              <a:p>
+                <a:pPr algn="just"/>
+                <a:r>
+                  <a:rPr lang="en-GB" sz="2000" dirty="0">
+                    <a:latin typeface="Century Gothic" panose="020B0502020202020204" pitchFamily="34" charset="0"/>
+                  </a:rPr>
+                  <a:t>(we should include the rate of return on investment in banks)</a:t>
+                </a:r>
+              </a:p>
+            </p:txBody>
+          </p:sp>
+        </mc:Choice>
+        <mc:Fallback xmlns="">
+          <p:sp>
+            <p:nvSpPr>
+              <p:cNvPr id="2" name="Marcador de contenido 1">
+                <a:extLst>
+                  <a:ext uri="{FF2B5EF4-FFF2-40B4-BE49-F238E27FC236}">
+                    <a16:creationId xmlns:a16="http://schemas.microsoft.com/office/drawing/2014/main" id="{1E76053E-E553-4C2C-919A-CE7A30FA73F9}"/>
+                  </a:ext>
+                </a:extLst>
+              </p:cNvPr>
+              <p:cNvSpPr>
+                <a:spLocks noGrp="1" noRot="1" noChangeAspect="1" noMove="1" noResize="1" noEditPoints="1" noAdjustHandles="1" noChangeArrowheads="1" noChangeShapeType="1" noTextEdit="1"/>
+              </p:cNvSpPr>
+              <p:nvPr>
+                <p:ph idx="1"/>
+              </p:nvPr>
+            </p:nvSpPr>
+            <p:spPr>
+              <a:xfrm>
+                <a:off x="687841" y="1832870"/>
+                <a:ext cx="10628026" cy="3927423"/>
+              </a:xfrm>
+              <a:blipFill>
+                <a:blip r:embed="rId2"/>
+                <a:stretch>
+                  <a:fillRect l="-597" t="-968" r="-717"/>
+                </a:stretch>
+              </a:blipFill>
+            </p:spPr>
+            <p:txBody>
+              <a:bodyPr/>
+              <a:lstStyle/>
+              <a:p>
+                <a:r>
+                  <a:rPr lang="es-CO">
+                    <a:noFill/>
+                  </a:rPr>
+                  <a:t> </a:t>
+                </a:r>
+              </a:p>
+            </p:txBody>
+          </p:sp>
+        </mc:Fallback>
+      </mc:AlternateContent>
+      <p:sp>
+        <p:nvSpPr>
+          <p:cNvPr id="3" name="Título 2">
+            <a:extLst>
+              <a:ext uri="{FF2B5EF4-FFF2-40B4-BE49-F238E27FC236}">
+                <a16:creationId xmlns:a16="http://schemas.microsoft.com/office/drawing/2014/main" id="{5DA68AA8-71CC-44C3-BE34-4520548865CD}"/>
+              </a:ext>
+            </a:extLst>
+          </p:cNvPr>
+          <p:cNvSpPr>
+            <a:spLocks noGrp="1"/>
+          </p:cNvSpPr>
+          <p:nvPr>
+            <p:ph type="title"/>
+          </p:nvPr>
+        </p:nvSpPr>
+        <p:spPr>
+          <a:xfrm>
+            <a:off x="687841" y="457517"/>
+            <a:ext cx="7694645" cy="979127"/>
+          </a:xfrm>
+        </p:spPr>
+        <p:txBody>
+          <a:bodyPr>
+            <a:noAutofit/>
+          </a:bodyPr>
+          <a:lstStyle/>
+          <a:p>
+            <a:pPr algn="l"/>
+            <a:r>
+              <a:rPr lang="es-CO" b="1" dirty="0">
+                <a:latin typeface="Century Gothic" panose="020B0502020202020204" pitchFamily="34" charset="0"/>
+              </a:rPr>
+              <a:t>Equities and ownership structure </a:t>
+            </a:r>
+          </a:p>
+        </p:txBody>
+      </p:sp>
+    </p:spTree>
+    <p:extLst>
+      <p:ext uri="{BB962C8B-B14F-4D97-AF65-F5344CB8AC3E}">
+        <p14:creationId xmlns:p14="http://schemas.microsoft.com/office/powerpoint/2010/main" val="151539734"/>
+      </p:ext>
+    </p:extLst>
+  </p:cSld>
+  <p:clrMapOvr>
+    <a:masterClrMapping/>
+  </p:clrMapOvr>
+</p:sld>
+</file>
+
+<file path=ppt/slides/slide14.xml><?xml version="1.0" encoding="utf-8"?>
+<p:sld xmlns:a="http://schemas.openxmlformats.org/drawingml/2006/main" xmlns:r="http://schemas.openxmlformats.org/officeDocument/2006/relationships" xmlns:p="http://schemas.openxmlformats.org/presentationml/2006/main">
+  <p:cSld>
+    <p:spTree>
+      <p:nvGrpSpPr>
+        <p:cNvPr id="1" name=""/>
+        <p:cNvGrpSpPr/>
+        <p:nvPr/>
+      </p:nvGrpSpPr>
+      <p:grpSpPr>
+        <a:xfrm>
+          <a:off x="0" y="0"/>
+          <a:ext cx="0" cy="0"/>
+          <a:chOff x="0" y="0"/>
+          <a:chExt cx="0" cy="0"/>
+        </a:xfrm>
+      </p:grpSpPr>
+      <mc:AlternateContent xmlns:mc="http://schemas.openxmlformats.org/markup-compatibility/2006" xmlns:a14="http://schemas.microsoft.com/office/drawing/2010/main">
+        <mc:Choice Requires="a14">
+          <p:sp>
+            <p:nvSpPr>
+              <p:cNvPr id="2" name="Marcador de contenido 1">
+                <a:extLst>
+                  <a:ext uri="{FF2B5EF4-FFF2-40B4-BE49-F238E27FC236}">
+                    <a16:creationId xmlns:a16="http://schemas.microsoft.com/office/drawing/2014/main" id="{1E76053E-E553-4C2C-919A-CE7A30FA73F9}"/>
+                  </a:ext>
+                </a:extLst>
+              </p:cNvPr>
+              <p:cNvSpPr>
+                <a:spLocks noGrp="1"/>
+              </p:cNvSpPr>
+              <p:nvPr>
+                <p:ph idx="1"/>
+              </p:nvPr>
+            </p:nvSpPr>
+            <p:spPr>
+              <a:xfrm>
+                <a:off x="687841" y="1845933"/>
+                <a:ext cx="10628026" cy="3927423"/>
+              </a:xfrm>
+            </p:spPr>
+            <p:txBody>
+              <a:bodyPr>
+                <a:noAutofit/>
+              </a:bodyPr>
+              <a:lstStyle/>
+              <a:p>
+                <a:pPr algn="just"/>
+                <a:r>
+                  <a:rPr lang="en-GB" sz="2000" dirty="0">
+                    <a:latin typeface="Century Gothic" panose="020B0502020202020204" pitchFamily="34" charset="0"/>
+                  </a:rPr>
+                  <a:t>Finally, the effective FDI will be equal to the value of the equities available to the rest of the world.</a:t>
+                </a:r>
+              </a:p>
+              <a:p>
+                <a:pPr marL="0" indent="0" algn="just">
+                  <a:buNone/>
+                </a:pPr>
+                <a:endParaRPr lang="en-GB" sz="2000" dirty="0">
+                  <a:latin typeface="Century Gothic" panose="020B0502020202020204" pitchFamily="34" charset="0"/>
+                </a:endParaRPr>
+              </a:p>
+              <a:p>
+                <a:pPr marL="0" indent="0" algn="just">
+                  <a:buNone/>
+                </a:pPr>
+                <a14:m>
+                  <m:oMathPara xmlns:m="http://schemas.openxmlformats.org/officeDocument/2006/math">
+                    <m:oMathParaPr>
+                      <m:jc m:val="centerGroup"/>
+                    </m:oMathParaPr>
+                    <m:oMath xmlns:m="http://schemas.openxmlformats.org/officeDocument/2006/math">
+                      <m:r>
+                        <a:rPr lang="es-ES" sz="1800" i="1" smtClean="0">
+                          <a:latin typeface="Cambria Math" panose="02040503050406030204" pitchFamily="18" charset="0"/>
+                          <a:ea typeface="Cambria Math" panose="02040503050406030204" pitchFamily="18" charset="0"/>
+                        </a:rPr>
+                        <m:t>𝐹</m:t>
+                      </m:r>
+                      <m:r>
+                        <a:rPr lang="es-ES" sz="1800" b="0" i="1" smtClean="0">
+                          <a:latin typeface="Cambria Math" panose="02040503050406030204" pitchFamily="18" charset="0"/>
+                          <a:ea typeface="Cambria Math" panose="02040503050406030204" pitchFamily="18" charset="0"/>
+                        </a:rPr>
+                        <m:t>𝐷</m:t>
+                      </m:r>
+                      <m:sSubSup>
+                        <m:sSubSupPr>
+                          <m:ctrlPr>
+                            <a:rPr lang="es-ES" sz="1800" b="0" i="1" smtClean="0">
+                              <a:latin typeface="Cambria Math" panose="02040503050406030204" pitchFamily="18" charset="0"/>
+                              <a:ea typeface="Cambria Math" panose="02040503050406030204" pitchFamily="18" charset="0"/>
+                            </a:rPr>
+                          </m:ctrlPr>
+                        </m:sSubSupPr>
+                        <m:e>
+                          <m:r>
+                            <a:rPr lang="es-ES" sz="1800" b="0" i="1" smtClean="0">
+                              <a:latin typeface="Cambria Math" panose="02040503050406030204" pitchFamily="18" charset="0"/>
+                              <a:ea typeface="Cambria Math" panose="02040503050406030204" pitchFamily="18" charset="0"/>
+                            </a:rPr>
+                            <m:t>𝐼</m:t>
+                          </m:r>
+                        </m:e>
+                        <m:sub>
+                          <m:r>
+                            <a:rPr lang="es-ES" sz="1800" b="0" i="1" smtClean="0">
+                              <a:latin typeface="Cambria Math" panose="02040503050406030204" pitchFamily="18" charset="0"/>
+                              <a:ea typeface="Cambria Math" panose="02040503050406030204" pitchFamily="18" charset="0"/>
+                            </a:rPr>
+                            <m:t>𝐹</m:t>
+                          </m:r>
+                        </m:sub>
+                        <m:sup>
+                          <m:r>
+                            <a:rPr lang="es-ES" sz="1800" b="0" i="1" smtClean="0">
+                              <a:latin typeface="Cambria Math" panose="02040503050406030204" pitchFamily="18" charset="0"/>
+                              <a:ea typeface="Cambria Math" panose="02040503050406030204" pitchFamily="18" charset="0"/>
+                            </a:rPr>
+                            <m:t>𝑒</m:t>
+                          </m:r>
+                        </m:sup>
+                      </m:sSubSup>
+                      <m:r>
+                        <a:rPr lang="en-GB" sz="1800" i="1">
+                          <a:latin typeface="Cambria Math" panose="02040503050406030204" pitchFamily="18" charset="0"/>
+                          <a:ea typeface="Cambria Math" panose="02040503050406030204" pitchFamily="18" charset="0"/>
+                        </a:rPr>
+                        <m:t>=</m:t>
+                      </m:r>
+                      <m:f>
+                        <m:fPr>
+                          <m:ctrlPr>
+                            <a:rPr lang="en-GB" sz="1800" i="1" smtClean="0">
+                              <a:latin typeface="Cambria Math" panose="02040503050406030204" pitchFamily="18" charset="0"/>
+                              <a:ea typeface="Cambria Math" panose="02040503050406030204" pitchFamily="18" charset="0"/>
+                            </a:rPr>
+                          </m:ctrlPr>
+                        </m:fPr>
+                        <m:num>
+                          <m:sSubSup>
+                            <m:sSubSupPr>
+                              <m:ctrlPr>
+                                <a:rPr lang="es-CO" sz="1800" i="1">
+                                  <a:latin typeface="Cambria Math" panose="02040503050406030204" pitchFamily="18" charset="0"/>
+                                  <a:ea typeface="Cambria Math" panose="02040503050406030204" pitchFamily="18" charset="0"/>
+                                </a:rPr>
+                              </m:ctrlPr>
+                            </m:sSubSupPr>
+                            <m:e>
+                              <m:sSub>
+                                <m:sSubPr>
+                                  <m:ctrlPr>
+                                    <a:rPr lang="es-ES" sz="1800" i="1">
+                                      <a:latin typeface="Cambria Math" panose="02040503050406030204" pitchFamily="18" charset="0"/>
+                                      <a:ea typeface="Cambria Math" panose="02040503050406030204" pitchFamily="18" charset="0"/>
+                                    </a:rPr>
+                                  </m:ctrlPr>
+                                </m:sSubPr>
+                                <m:e>
+                                  <m:r>
+                                    <a:rPr lang="es-ES" sz="1800" i="1">
+                                      <a:latin typeface="Cambria Math" panose="02040503050406030204" pitchFamily="18" charset="0"/>
+                                      <a:ea typeface="Cambria Math" panose="02040503050406030204" pitchFamily="18" charset="0"/>
+                                    </a:rPr>
+                                    <m:t>𝑃</m:t>
+                                  </m:r>
+                                </m:e>
+                                <m:sub>
+                                  <m:r>
+                                    <a:rPr lang="es-ES" sz="1800" i="1">
+                                      <a:latin typeface="Cambria Math" panose="02040503050406030204" pitchFamily="18" charset="0"/>
+                                      <a:ea typeface="Cambria Math" panose="02040503050406030204" pitchFamily="18" charset="0"/>
+                                    </a:rPr>
+                                    <m:t>𝐸</m:t>
+                                  </m:r>
+                                </m:sub>
+                              </m:sSub>
+                              <m:acc>
+                                <m:accPr>
+                                  <m:chr m:val="̇"/>
+                                  <m:ctrlPr>
+                                    <a:rPr lang="es-CO" sz="1800" i="1">
+                                      <a:latin typeface="Cambria Math" panose="02040503050406030204" pitchFamily="18" charset="0"/>
+                                      <a:ea typeface="Cambria Math" panose="02040503050406030204" pitchFamily="18" charset="0"/>
+                                    </a:rPr>
+                                  </m:ctrlPr>
+                                </m:accPr>
+                                <m:e>
+                                  <m:r>
+                                    <a:rPr lang="es-CO" sz="1800" i="1">
+                                      <a:latin typeface="Cambria Math" panose="02040503050406030204" pitchFamily="18" charset="0"/>
+                                      <a:ea typeface="Cambria Math" panose="02040503050406030204" pitchFamily="18" charset="0"/>
+                                    </a:rPr>
+                                    <m:t>𝐸𝑄</m:t>
+                                  </m:r>
+                                </m:e>
+                              </m:acc>
+                            </m:e>
+                            <m:sub>
+                              <m:r>
+                                <a:rPr lang="es-CO" sz="1800" i="1">
+                                  <a:latin typeface="Cambria Math" panose="02040503050406030204" pitchFamily="18" charset="0"/>
+                                  <a:ea typeface="Cambria Math" panose="02040503050406030204" pitchFamily="18" charset="0"/>
+                                </a:rPr>
+                                <m:t>𝐹</m:t>
+                              </m:r>
+                            </m:sub>
+                            <m:sup>
+                              <m:r>
+                                <a:rPr lang="es-ES" sz="1800" i="1">
+                                  <a:latin typeface="Cambria Math" panose="02040503050406030204" pitchFamily="18" charset="0"/>
+                                  <a:ea typeface="Cambria Math" panose="02040503050406030204" pitchFamily="18" charset="0"/>
+                                </a:rPr>
+                                <m:t>𝑅𝑂𝑊</m:t>
+                              </m:r>
+                              <m:r>
+                                <a:rPr lang="es-ES" sz="1800" i="1">
+                                  <a:latin typeface="Cambria Math" panose="02040503050406030204" pitchFamily="18" charset="0"/>
+                                  <a:ea typeface="Cambria Math" panose="02040503050406030204" pitchFamily="18" charset="0"/>
+                                </a:rPr>
+                                <m:t>, </m:t>
+                              </m:r>
+                              <m:r>
+                                <a:rPr lang="es-ES" sz="1800" i="1">
+                                  <a:latin typeface="Cambria Math" panose="02040503050406030204" pitchFamily="18" charset="0"/>
+                                  <a:ea typeface="Cambria Math" panose="02040503050406030204" pitchFamily="18" charset="0"/>
+                                </a:rPr>
+                                <m:t>𝑠</m:t>
+                              </m:r>
+                            </m:sup>
+                          </m:sSubSup>
+                        </m:num>
+                        <m:den>
+                          <m:sSub>
+                            <m:sSubPr>
+                              <m:ctrlPr>
+                                <a:rPr lang="es-ES" sz="1800" b="0" i="1" smtClean="0">
+                                  <a:latin typeface="Cambria Math" panose="02040503050406030204" pitchFamily="18" charset="0"/>
+                                  <a:ea typeface="Cambria Math" panose="02040503050406030204" pitchFamily="18" charset="0"/>
+                                </a:rPr>
+                              </m:ctrlPr>
+                            </m:sSubPr>
+                            <m:e>
+                              <m:r>
+                                <a:rPr lang="es-ES" sz="1800" b="0" i="1" smtClean="0">
+                                  <a:latin typeface="Cambria Math" panose="02040503050406030204" pitchFamily="18" charset="0"/>
+                                  <a:ea typeface="Cambria Math" panose="02040503050406030204" pitchFamily="18" charset="0"/>
+                                </a:rPr>
+                                <m:t>𝑒</m:t>
+                              </m:r>
+                            </m:e>
+                            <m:sub>
+                              <m:r>
+                                <a:rPr lang="es-ES" sz="1800" b="0" i="1" smtClean="0">
+                                  <a:latin typeface="Cambria Math" panose="02040503050406030204" pitchFamily="18" charset="0"/>
+                                  <a:ea typeface="Cambria Math" panose="02040503050406030204" pitchFamily="18" charset="0"/>
+                                </a:rPr>
+                                <m:t>𝑁</m:t>
+                              </m:r>
+                            </m:sub>
+                          </m:sSub>
+                        </m:den>
+                      </m:f>
+                      <m:r>
+                        <a:rPr lang="es-CO" sz="1800" i="1" smtClean="0">
+                          <a:latin typeface="Cambria Math" panose="02040503050406030204" pitchFamily="18" charset="0"/>
+                          <a:ea typeface="Cambria Math" panose="02040503050406030204" pitchFamily="18" charset="0"/>
+                        </a:rPr>
+                        <m:t> </m:t>
+                      </m:r>
+                      <m:r>
+                        <a:rPr lang="es-ES" sz="1800" b="0" i="1" smtClean="0">
+                          <a:latin typeface="Cambria Math" panose="02040503050406030204" pitchFamily="18" charset="0"/>
+                          <a:ea typeface="Cambria Math" panose="02040503050406030204" pitchFamily="18" charset="0"/>
+                        </a:rPr>
+                        <m:t>(23)</m:t>
+                      </m:r>
+                    </m:oMath>
+                  </m:oMathPara>
+                </a14:m>
+                <a:endParaRPr lang="es-CO" sz="1800" dirty="0">
+                  <a:latin typeface="Cambria Math" panose="02040503050406030204" pitchFamily="18" charset="0"/>
+                  <a:ea typeface="Cambria Math" panose="02040503050406030204" pitchFamily="18" charset="0"/>
+                </a:endParaRPr>
+              </a:p>
+              <a:p>
+                <a:pPr marL="0" indent="0" algn="just">
+                  <a:buNone/>
+                </a:pPr>
+                <a:endParaRPr lang="es-ES" sz="1800" i="1" dirty="0"/>
+              </a:p>
+              <a:p>
+                <a:pPr algn="just"/>
+                <a:r>
+                  <a:rPr lang="es-ES" sz="1800" i="1" dirty="0" err="1">
+                    <a:latin typeface="Century Gothic" panose="020B0502020202020204" pitchFamily="34" charset="0"/>
+                  </a:rPr>
+                  <a:t>The</a:t>
+                </a:r>
+                <a:r>
+                  <a:rPr lang="es-ES" sz="1800" i="1" dirty="0">
+                    <a:latin typeface="Century Gothic" panose="020B0502020202020204" pitchFamily="34" charset="0"/>
+                  </a:rPr>
+                  <a:t> </a:t>
+                </a:r>
+                <a:r>
+                  <a:rPr lang="es-ES" sz="1800" i="1" dirty="0" err="1">
+                    <a:latin typeface="Century Gothic" panose="020B0502020202020204" pitchFamily="34" charset="0"/>
+                  </a:rPr>
+                  <a:t>difference</a:t>
+                </a:r>
+                <a:r>
+                  <a:rPr lang="es-ES" sz="1800" i="1" dirty="0">
+                    <a:latin typeface="Century Gothic" panose="020B0502020202020204" pitchFamily="34" charset="0"/>
+                  </a:rPr>
+                  <a:t> </a:t>
+                </a:r>
+                <a:r>
+                  <a:rPr lang="es-ES" sz="1800" i="1" dirty="0" err="1">
+                    <a:latin typeface="Century Gothic" panose="020B0502020202020204" pitchFamily="34" charset="0"/>
+                  </a:rPr>
+                  <a:t>between</a:t>
+                </a:r>
+                <a:r>
+                  <a:rPr lang="es-ES" sz="1800" i="1" dirty="0">
+                    <a:latin typeface="Century Gothic" panose="020B0502020202020204" pitchFamily="34" charset="0"/>
+                  </a:rPr>
+                  <a:t> </a:t>
+                </a:r>
+                <a:r>
+                  <a:rPr lang="es-ES" sz="1800" i="1" dirty="0" err="1">
+                    <a:latin typeface="Century Gothic" panose="020B0502020202020204" pitchFamily="34" charset="0"/>
+                  </a:rPr>
+                  <a:t>the</a:t>
+                </a:r>
+                <a:r>
+                  <a:rPr lang="es-ES" sz="1800" i="1" dirty="0">
+                    <a:latin typeface="Century Gothic" panose="020B0502020202020204" pitchFamily="34" charset="0"/>
+                  </a:rPr>
+                  <a:t> </a:t>
+                </a:r>
+                <a:r>
+                  <a:rPr lang="es-ES" sz="1800" i="1" dirty="0" err="1">
+                    <a:latin typeface="Century Gothic" panose="020B0502020202020204" pitchFamily="34" charset="0"/>
+                  </a:rPr>
+                  <a:t>effective</a:t>
+                </a:r>
+                <a:r>
+                  <a:rPr lang="es-ES" sz="1800" i="1" dirty="0">
+                    <a:latin typeface="Century Gothic" panose="020B0502020202020204" pitchFamily="34" charset="0"/>
+                  </a:rPr>
+                  <a:t> and </a:t>
+                </a:r>
+                <a:r>
+                  <a:rPr lang="es-ES" sz="1800" i="1" dirty="0" err="1">
+                    <a:latin typeface="Century Gothic" panose="020B0502020202020204" pitchFamily="34" charset="0"/>
+                  </a:rPr>
+                  <a:t>desired</a:t>
+                </a:r>
+                <a:r>
+                  <a:rPr lang="es-ES" sz="1800" i="1" dirty="0">
+                    <a:latin typeface="Century Gothic" panose="020B0502020202020204" pitchFamily="34" charset="0"/>
+                  </a:rPr>
+                  <a:t> FDI </a:t>
+                </a:r>
+                <a:r>
+                  <a:rPr lang="es-ES" sz="1800" i="1" dirty="0" err="1">
+                    <a:latin typeface="Century Gothic" panose="020B0502020202020204" pitchFamily="34" charset="0"/>
+                  </a:rPr>
+                  <a:t>will</a:t>
+                </a:r>
+                <a:r>
+                  <a:rPr lang="es-ES" sz="1800" i="1" dirty="0">
+                    <a:latin typeface="Century Gothic" panose="020B0502020202020204" pitchFamily="34" charset="0"/>
+                  </a:rPr>
+                  <a:t> be </a:t>
+                </a:r>
+                <a:r>
+                  <a:rPr lang="es-ES" sz="1800" i="1" dirty="0" err="1">
+                    <a:latin typeface="Century Gothic" panose="020B0502020202020204" pitchFamily="34" charset="0"/>
+                  </a:rPr>
+                  <a:t>equivalent</a:t>
+                </a:r>
+                <a:r>
+                  <a:rPr lang="es-ES" sz="1800" i="1" dirty="0">
+                    <a:latin typeface="Century Gothic" panose="020B0502020202020204" pitchFamily="34" charset="0"/>
+                  </a:rPr>
+                  <a:t> to </a:t>
+                </a:r>
+                <a:r>
+                  <a:rPr lang="es-ES" sz="1800" i="1" dirty="0" err="1">
+                    <a:latin typeface="Century Gothic" panose="020B0502020202020204" pitchFamily="34" charset="0"/>
+                  </a:rPr>
+                  <a:t>the</a:t>
+                </a:r>
+                <a:r>
+                  <a:rPr lang="es-ES" sz="1800" i="1" dirty="0">
+                    <a:latin typeface="Century Gothic" panose="020B0502020202020204" pitchFamily="34" charset="0"/>
+                  </a:rPr>
+                  <a:t> </a:t>
+                </a:r>
+                <a:r>
+                  <a:rPr lang="es-ES" sz="1800" i="1" dirty="0" err="1">
+                    <a:latin typeface="Century Gothic" panose="020B0502020202020204" pitchFamily="34" charset="0"/>
+                  </a:rPr>
+                  <a:t>variation</a:t>
+                </a:r>
+                <a:r>
+                  <a:rPr lang="es-ES" sz="1800" i="1" dirty="0">
+                    <a:latin typeface="Century Gothic" panose="020B0502020202020204" pitchFamily="34" charset="0"/>
+                  </a:rPr>
+                  <a:t> of </a:t>
+                </a:r>
+                <a:r>
+                  <a:rPr lang="es-ES" sz="1800" i="1" dirty="0" err="1">
+                    <a:latin typeface="Century Gothic" panose="020B0502020202020204" pitchFamily="34" charset="0"/>
+                  </a:rPr>
+                  <a:t>deposits</a:t>
+                </a:r>
+                <a:r>
+                  <a:rPr lang="es-ES" sz="1800" i="1" dirty="0">
+                    <a:latin typeface="Century Gothic" panose="020B0502020202020204" pitchFamily="34" charset="0"/>
+                  </a:rPr>
+                  <a:t> </a:t>
+                </a:r>
+                <a:r>
+                  <a:rPr lang="es-ES" sz="1800" i="1" dirty="0" err="1">
+                    <a:latin typeface="Century Gothic" panose="020B0502020202020204" pitchFamily="34" charset="0"/>
+                  </a:rPr>
+                  <a:t>from</a:t>
+                </a:r>
+                <a:r>
+                  <a:rPr lang="es-ES" sz="1800" i="1" dirty="0">
+                    <a:latin typeface="Century Gothic" panose="020B0502020202020204" pitchFamily="34" charset="0"/>
+                  </a:rPr>
+                  <a:t> </a:t>
+                </a:r>
+                <a:r>
+                  <a:rPr lang="es-ES" sz="1800" i="1" dirty="0" err="1">
+                    <a:latin typeface="Century Gothic" panose="020B0502020202020204" pitchFamily="34" charset="0"/>
+                  </a:rPr>
+                  <a:t>the</a:t>
+                </a:r>
+                <a:r>
+                  <a:rPr lang="es-ES" sz="1800" i="1" dirty="0">
+                    <a:latin typeface="Century Gothic" panose="020B0502020202020204" pitchFamily="34" charset="0"/>
+                  </a:rPr>
+                  <a:t> </a:t>
+                </a:r>
+                <a:r>
+                  <a:rPr lang="es-ES" sz="1800" i="1" dirty="0" err="1">
+                    <a:latin typeface="Century Gothic" panose="020B0502020202020204" pitchFamily="34" charset="0"/>
+                  </a:rPr>
+                  <a:t>rest</a:t>
+                </a:r>
+                <a:r>
+                  <a:rPr lang="es-ES" sz="1800" i="1" dirty="0">
+                    <a:latin typeface="Century Gothic" panose="020B0502020202020204" pitchFamily="34" charset="0"/>
+                  </a:rPr>
+                  <a:t> of </a:t>
+                </a:r>
+                <a:r>
+                  <a:rPr lang="es-ES" sz="1800" i="1" dirty="0" err="1">
+                    <a:latin typeface="Century Gothic" panose="020B0502020202020204" pitchFamily="34" charset="0"/>
+                  </a:rPr>
+                  <a:t>the</a:t>
+                </a:r>
+                <a:r>
+                  <a:rPr lang="es-ES" sz="1800" i="1" dirty="0">
+                    <a:latin typeface="Century Gothic" panose="020B0502020202020204" pitchFamily="34" charset="0"/>
+                  </a:rPr>
+                  <a:t> </a:t>
+                </a:r>
+                <a:r>
+                  <a:rPr lang="es-ES" sz="1800" i="1" dirty="0" err="1">
+                    <a:latin typeface="Century Gothic" panose="020B0502020202020204" pitchFamily="34" charset="0"/>
+                  </a:rPr>
+                  <a:t>world</a:t>
+                </a:r>
+                <a:r>
+                  <a:rPr lang="es-ES" sz="1800" i="1" dirty="0">
+                    <a:latin typeface="Century Gothic" panose="020B0502020202020204" pitchFamily="34" charset="0"/>
+                  </a:rPr>
+                  <a:t> in </a:t>
+                </a:r>
+                <a:r>
+                  <a:rPr lang="es-ES" sz="1800" i="1" dirty="0" err="1">
+                    <a:latin typeface="Century Gothic" panose="020B0502020202020204" pitchFamily="34" charset="0"/>
+                  </a:rPr>
+                  <a:t>domestic</a:t>
+                </a:r>
+                <a:r>
+                  <a:rPr lang="es-ES" sz="1800" i="1" dirty="0">
+                    <a:latin typeface="Century Gothic" panose="020B0502020202020204" pitchFamily="34" charset="0"/>
+                  </a:rPr>
+                  <a:t> Banks</a:t>
+                </a:r>
+              </a:p>
+              <a:p>
+                <a:pPr algn="just"/>
+                <a:endParaRPr lang="es-ES" sz="1800" i="1" dirty="0">
+                  <a:latin typeface="Century Gothic" panose="020B0502020202020204" pitchFamily="34" charset="0"/>
+                </a:endParaRPr>
+              </a:p>
+              <a:p>
+                <a:pPr marL="0" indent="0" algn="just">
+                  <a:buNone/>
+                </a:pPr>
+                <a14:m>
+                  <m:oMathPara xmlns:m="http://schemas.openxmlformats.org/officeDocument/2006/math">
+                    <m:oMathParaPr>
+                      <m:jc m:val="centerGroup"/>
+                    </m:oMathParaPr>
+                    <m:oMath xmlns:m="http://schemas.openxmlformats.org/officeDocument/2006/math">
+                      <m:acc>
+                        <m:accPr>
+                          <m:chr m:val="̇"/>
+                          <m:ctrlPr>
+                            <a:rPr lang="es-ES" sz="1800" b="0" i="1" smtClean="0">
+                              <a:latin typeface="Cambria Math" panose="02040503050406030204" pitchFamily="18" charset="0"/>
+                              <a:ea typeface="Cambria Math" panose="02040503050406030204" pitchFamily="18" charset="0"/>
+                            </a:rPr>
+                          </m:ctrlPr>
+                        </m:accPr>
+                        <m:e>
+                          <m:sSup>
+                            <m:sSupPr>
+                              <m:ctrlPr>
+                                <a:rPr lang="es-ES" sz="1800" i="1">
+                                  <a:latin typeface="Cambria Math" panose="02040503050406030204" pitchFamily="18" charset="0"/>
+                                  <a:ea typeface="Cambria Math" panose="02040503050406030204" pitchFamily="18" charset="0"/>
+                                </a:rPr>
+                              </m:ctrlPr>
+                            </m:sSupPr>
+                            <m:e>
+                              <m:r>
+                                <a:rPr lang="es-ES" sz="1800" i="1">
+                                  <a:latin typeface="Cambria Math" panose="02040503050406030204" pitchFamily="18" charset="0"/>
+                                  <a:ea typeface="Cambria Math" panose="02040503050406030204" pitchFamily="18" charset="0"/>
+                                </a:rPr>
+                                <m:t>𝐷</m:t>
+                              </m:r>
+                            </m:e>
+                            <m:sup>
+                              <m:r>
+                                <a:rPr lang="es-ES" sz="1800" i="1">
+                                  <a:latin typeface="Cambria Math" panose="02040503050406030204" pitchFamily="18" charset="0"/>
+                                  <a:ea typeface="Cambria Math" panose="02040503050406030204" pitchFamily="18" charset="0"/>
+                                </a:rPr>
+                                <m:t>𝑅𝑂𝑊</m:t>
+                              </m:r>
+                            </m:sup>
+                          </m:sSup>
+                        </m:e>
+                      </m:acc>
+                      <m:r>
+                        <a:rPr lang="es-ES" sz="1800" b="0" i="1" smtClean="0">
+                          <a:latin typeface="Cambria Math" panose="02040503050406030204" pitchFamily="18" charset="0"/>
+                          <a:ea typeface="Cambria Math" panose="02040503050406030204" pitchFamily="18" charset="0"/>
+                        </a:rPr>
+                        <m:t>=</m:t>
+                      </m:r>
+                      <m:r>
+                        <a:rPr lang="es-ES" sz="1800" i="1">
+                          <a:latin typeface="Cambria Math" panose="02040503050406030204" pitchFamily="18" charset="0"/>
+                          <a:ea typeface="Cambria Math" panose="02040503050406030204" pitchFamily="18" charset="0"/>
+                        </a:rPr>
+                        <m:t>𝐹𝐷</m:t>
+                      </m:r>
+                      <m:sSubSup>
+                        <m:sSubSupPr>
+                          <m:ctrlPr>
+                            <a:rPr lang="es-ES" sz="1800" i="1">
+                              <a:latin typeface="Cambria Math" panose="02040503050406030204" pitchFamily="18" charset="0"/>
+                              <a:ea typeface="Cambria Math" panose="02040503050406030204" pitchFamily="18" charset="0"/>
+                            </a:rPr>
+                          </m:ctrlPr>
+                        </m:sSubSupPr>
+                        <m:e>
+                          <m:r>
+                            <a:rPr lang="es-ES" sz="1800" i="1">
+                              <a:latin typeface="Cambria Math" panose="02040503050406030204" pitchFamily="18" charset="0"/>
+                              <a:ea typeface="Cambria Math" panose="02040503050406030204" pitchFamily="18" charset="0"/>
+                            </a:rPr>
+                            <m:t>𝐼</m:t>
+                          </m:r>
+                        </m:e>
+                        <m:sub>
+                          <m:r>
+                            <a:rPr lang="es-ES" sz="1800" i="1">
+                              <a:latin typeface="Cambria Math" panose="02040503050406030204" pitchFamily="18" charset="0"/>
+                              <a:ea typeface="Cambria Math" panose="02040503050406030204" pitchFamily="18" charset="0"/>
+                            </a:rPr>
+                            <m:t>𝐹</m:t>
+                          </m:r>
+                        </m:sub>
+                        <m:sup>
+                          <m:r>
+                            <a:rPr lang="es-ES" sz="1800" i="1">
+                              <a:latin typeface="Cambria Math" panose="02040503050406030204" pitchFamily="18" charset="0"/>
+                              <a:ea typeface="Cambria Math" panose="02040503050406030204" pitchFamily="18" charset="0"/>
+                            </a:rPr>
+                            <m:t>𝑒</m:t>
+                          </m:r>
+                        </m:sup>
+                      </m:sSubSup>
+                      <m:r>
+                        <a:rPr lang="es-ES" sz="1800" b="0" i="1" smtClean="0">
+                          <a:latin typeface="Cambria Math" panose="02040503050406030204" pitchFamily="18" charset="0"/>
+                          <a:ea typeface="Cambria Math" panose="02040503050406030204" pitchFamily="18" charset="0"/>
+                        </a:rPr>
+                        <m:t>−</m:t>
+                      </m:r>
+                      <m:r>
+                        <a:rPr lang="es-ES" sz="1800" i="1">
+                          <a:latin typeface="Cambria Math" panose="02040503050406030204" pitchFamily="18" charset="0"/>
+                          <a:ea typeface="Cambria Math" panose="02040503050406030204" pitchFamily="18" charset="0"/>
+                        </a:rPr>
+                        <m:t>𝐹𝐷</m:t>
+                      </m:r>
+                      <m:sSubSup>
+                        <m:sSubSupPr>
+                          <m:ctrlPr>
+                            <a:rPr lang="es-ES" sz="1800" i="1">
+                              <a:latin typeface="Cambria Math" panose="02040503050406030204" pitchFamily="18" charset="0"/>
+                              <a:ea typeface="Cambria Math" panose="02040503050406030204" pitchFamily="18" charset="0"/>
+                            </a:rPr>
+                          </m:ctrlPr>
+                        </m:sSubSupPr>
+                        <m:e>
+                          <m:r>
+                            <a:rPr lang="es-ES" sz="1800" i="1">
+                              <a:latin typeface="Cambria Math" panose="02040503050406030204" pitchFamily="18" charset="0"/>
+                              <a:ea typeface="Cambria Math" panose="02040503050406030204" pitchFamily="18" charset="0"/>
+                            </a:rPr>
+                            <m:t>𝐼</m:t>
+                          </m:r>
+                        </m:e>
+                        <m:sub>
+                          <m:r>
+                            <a:rPr lang="es-ES" sz="1800" i="1">
+                              <a:latin typeface="Cambria Math" panose="02040503050406030204" pitchFamily="18" charset="0"/>
+                              <a:ea typeface="Cambria Math" panose="02040503050406030204" pitchFamily="18" charset="0"/>
+                            </a:rPr>
+                            <m:t>𝐹</m:t>
+                          </m:r>
+                        </m:sub>
+                        <m:sup>
+                          <m:r>
+                            <a:rPr lang="es-ES" sz="1800" b="0" i="1" smtClean="0">
+                              <a:latin typeface="Cambria Math" panose="02040503050406030204" pitchFamily="18" charset="0"/>
+                              <a:ea typeface="Cambria Math" panose="02040503050406030204" pitchFamily="18" charset="0"/>
+                            </a:rPr>
+                            <m:t>𝑑</m:t>
+                          </m:r>
+                        </m:sup>
+                      </m:sSubSup>
+                      <m:r>
+                        <a:rPr lang="es-ES" sz="1800" b="0" i="1" smtClean="0">
+                          <a:latin typeface="Cambria Math" panose="02040503050406030204" pitchFamily="18" charset="0"/>
+                          <a:ea typeface="Cambria Math" panose="02040503050406030204" pitchFamily="18" charset="0"/>
+                        </a:rPr>
+                        <m:t>(24)</m:t>
+                      </m:r>
+                    </m:oMath>
+                  </m:oMathPara>
+                </a14:m>
+                <a:endParaRPr lang="es-ES" sz="1800" i="1" dirty="0">
+                  <a:latin typeface="Century Gothic" panose="020B0502020202020204" pitchFamily="34" charset="0"/>
+                </a:endParaRPr>
+              </a:p>
+            </p:txBody>
+          </p:sp>
+        </mc:Choice>
+        <mc:Fallback xmlns="">
+          <p:sp>
+            <p:nvSpPr>
+              <p:cNvPr id="2" name="Marcador de contenido 1">
+                <a:extLst>
+                  <a:ext uri="{FF2B5EF4-FFF2-40B4-BE49-F238E27FC236}">
+                    <a16:creationId xmlns:a16="http://schemas.microsoft.com/office/drawing/2014/main" id="{1E76053E-E553-4C2C-919A-CE7A30FA73F9}"/>
+                  </a:ext>
+                </a:extLst>
+              </p:cNvPr>
+              <p:cNvSpPr>
+                <a:spLocks noGrp="1" noRot="1" noChangeAspect="1" noMove="1" noResize="1" noEditPoints="1" noAdjustHandles="1" noChangeArrowheads="1" noChangeShapeType="1" noTextEdit="1"/>
+              </p:cNvSpPr>
+              <p:nvPr>
+                <p:ph idx="1"/>
+              </p:nvPr>
+            </p:nvSpPr>
+            <p:spPr>
+              <a:xfrm>
+                <a:off x="687841" y="1845933"/>
+                <a:ext cx="10628026" cy="3927423"/>
+              </a:xfrm>
+              <a:blipFill>
+                <a:blip r:embed="rId2"/>
+                <a:stretch>
+                  <a:fillRect l="-597" t="-968" r="-717"/>
+                </a:stretch>
+              </a:blipFill>
+            </p:spPr>
+            <p:txBody>
+              <a:bodyPr/>
+              <a:lstStyle/>
+              <a:p>
+                <a:r>
+                  <a:rPr lang="es-CO">
+                    <a:noFill/>
+                  </a:rPr>
+                  <a:t> </a:t>
+                </a:r>
+              </a:p>
+            </p:txBody>
+          </p:sp>
+        </mc:Fallback>
+      </mc:AlternateContent>
+      <p:sp>
+        <p:nvSpPr>
+          <p:cNvPr id="3" name="Título 2">
+            <a:extLst>
+              <a:ext uri="{FF2B5EF4-FFF2-40B4-BE49-F238E27FC236}">
+                <a16:creationId xmlns:a16="http://schemas.microsoft.com/office/drawing/2014/main" id="{5DA68AA8-71CC-44C3-BE34-4520548865CD}"/>
+              </a:ext>
+            </a:extLst>
+          </p:cNvPr>
+          <p:cNvSpPr>
+            <a:spLocks noGrp="1"/>
+          </p:cNvSpPr>
+          <p:nvPr>
+            <p:ph type="title"/>
+          </p:nvPr>
+        </p:nvSpPr>
+        <p:spPr>
+          <a:xfrm>
+            <a:off x="687841" y="457517"/>
+            <a:ext cx="7694645" cy="979127"/>
+          </a:xfrm>
+        </p:spPr>
+        <p:txBody>
+          <a:bodyPr>
+            <a:noAutofit/>
+          </a:bodyPr>
+          <a:lstStyle/>
+          <a:p>
+            <a:pPr algn="l"/>
+            <a:r>
+              <a:rPr lang="es-CO" b="1" dirty="0">
+                <a:latin typeface="Century Gothic" panose="020B0502020202020204" pitchFamily="34" charset="0"/>
+              </a:rPr>
+              <a:t>Equities and ownership structure </a:t>
+            </a:r>
+          </a:p>
+        </p:txBody>
+      </p:sp>
+    </p:spTree>
+    <p:extLst>
+      <p:ext uri="{BB962C8B-B14F-4D97-AF65-F5344CB8AC3E}">
+        <p14:creationId xmlns:p14="http://schemas.microsoft.com/office/powerpoint/2010/main" val="2507292676"/>
+      </p:ext>
+    </p:extLst>
+  </p:cSld>
+  <p:clrMapOvr>
+    <a:masterClrMapping/>
+  </p:clrMapOvr>
+</p:sld>
+</file>
+
+<file path=ppt/slides/slide15.xml><?xml version="1.0" encoding="utf-8"?>
+<p:sld xmlns:a="http://schemas.openxmlformats.org/drawingml/2006/main" xmlns:r="http://schemas.openxmlformats.org/officeDocument/2006/relationships" xmlns:p="http://schemas.openxmlformats.org/presentationml/2006/main">
+  <p:cSld>
+    <p:spTree>
+      <p:nvGrpSpPr>
+        <p:cNvPr id="1" name=""/>
+        <p:cNvGrpSpPr/>
+        <p:nvPr/>
+      </p:nvGrpSpPr>
+      <p:grpSpPr>
+        <a:xfrm>
+          <a:off x="0" y="0"/>
+          <a:ext cx="0" cy="0"/>
+          <a:chOff x="0" y="0"/>
+          <a:chExt cx="0" cy="0"/>
+        </a:xfrm>
+      </p:grpSpPr>
+      <p:sp>
+        <p:nvSpPr>
+          <p:cNvPr id="3" name="Título 2">
+            <a:extLst>
+              <a:ext uri="{FF2B5EF4-FFF2-40B4-BE49-F238E27FC236}">
+                <a16:creationId xmlns:a16="http://schemas.microsoft.com/office/drawing/2014/main" id="{5DA68AA8-71CC-44C3-BE34-4520548865CD}"/>
+              </a:ext>
+            </a:extLst>
+          </p:cNvPr>
+          <p:cNvSpPr>
+            <a:spLocks noGrp="1"/>
+          </p:cNvSpPr>
+          <p:nvPr>
+            <p:ph type="title"/>
+          </p:nvPr>
+        </p:nvSpPr>
+        <p:spPr>
+          <a:xfrm>
+            <a:off x="687841" y="457517"/>
+            <a:ext cx="7694645" cy="979127"/>
+          </a:xfrm>
+        </p:spPr>
+        <p:txBody>
+          <a:bodyPr>
+            <a:noAutofit/>
+          </a:bodyPr>
+          <a:lstStyle/>
+          <a:p>
+            <a:pPr algn="l"/>
+            <a:r>
+              <a:rPr lang="es-CO" b="1" dirty="0">
+                <a:latin typeface="Century Gothic" panose="020B0502020202020204" pitchFamily="34" charset="0"/>
+              </a:rPr>
+              <a:t>Outstanding issues</a:t>
+            </a:r>
+          </a:p>
+        </p:txBody>
+      </p:sp>
+      <p:sp>
+        <p:nvSpPr>
+          <p:cNvPr id="6" name="Marcador de contenido 1">
+            <a:extLst>
+              <a:ext uri="{FF2B5EF4-FFF2-40B4-BE49-F238E27FC236}">
+                <a16:creationId xmlns:a16="http://schemas.microsoft.com/office/drawing/2014/main" id="{218A62F6-6A87-AE43-956E-048CDA756C2E}"/>
+              </a:ext>
+            </a:extLst>
+          </p:cNvPr>
+          <p:cNvSpPr>
+            <a:spLocks noGrp="1"/>
+          </p:cNvSpPr>
+          <p:nvPr>
+            <p:ph idx="1"/>
+          </p:nvPr>
+        </p:nvSpPr>
+        <p:spPr>
+          <a:xfrm>
+            <a:off x="687841" y="1845933"/>
+            <a:ext cx="10628026" cy="3927423"/>
+          </a:xfrm>
+        </p:spPr>
+        <p:txBody>
+          <a:bodyPr>
+            <a:noAutofit/>
+          </a:bodyPr>
+          <a:lstStyle/>
+          <a:p>
+            <a:pPr algn="just"/>
+            <a:r>
+              <a:rPr lang="en-GB" sz="2000" dirty="0">
+                <a:latin typeface="Century Gothic" panose="020B0502020202020204" pitchFamily="34" charset="0"/>
+              </a:rPr>
+              <a:t>Distribution between Greenfield and non greenfield FDI aimed at the firm </a:t>
+            </a:r>
+          </a:p>
+          <a:p>
+            <a:pPr algn="just"/>
+            <a:endParaRPr lang="en-GB" sz="2000" dirty="0">
+              <a:latin typeface="Century Gothic" panose="020B0502020202020204" pitchFamily="34" charset="0"/>
+            </a:endParaRPr>
+          </a:p>
+          <a:p>
+            <a:pPr algn="just"/>
+            <a:r>
+              <a:rPr lang="en-GB" sz="2000" dirty="0">
+                <a:latin typeface="Century Gothic" panose="020B0502020202020204" pitchFamily="34" charset="0"/>
+              </a:rPr>
+              <a:t>Define the ownership structure of the banks, although we consider that it can be very similar to that of the firms.</a:t>
+            </a:r>
+          </a:p>
+          <a:p>
+            <a:pPr algn="just"/>
+            <a:endParaRPr lang="en-GB" sz="2000" dirty="0">
+              <a:latin typeface="Century Gothic" panose="020B0502020202020204" pitchFamily="34" charset="0"/>
+            </a:endParaRPr>
+          </a:p>
+          <a:p>
+            <a:pPr algn="just"/>
+            <a:r>
+              <a:rPr lang="en-GB" sz="2000" dirty="0">
+                <a:latin typeface="Century Gothic" panose="020B0502020202020204" pitchFamily="34" charset="0"/>
+              </a:rPr>
+              <a:t>Define the arbitration between FDI directed to firms and that directed to banks</a:t>
+            </a:r>
+          </a:p>
+        </p:txBody>
+      </p:sp>
+    </p:spTree>
+    <p:extLst>
+      <p:ext uri="{BB962C8B-B14F-4D97-AF65-F5344CB8AC3E}">
+        <p14:creationId xmlns:p14="http://schemas.microsoft.com/office/powerpoint/2010/main" val="2226128863"/>
+      </p:ext>
+    </p:extLst>
+  </p:cSld>
+  <p:clrMapOvr>
+    <a:masterClrMapping/>
+  </p:clrMapOvr>
+</p:sld>
+</file>
+
+<file path=ppt/slides/slide16.xml><?xml version="1.0" encoding="utf-8"?>
+<p:sld xmlns:a="http://schemas.openxmlformats.org/drawingml/2006/main" xmlns:r="http://schemas.openxmlformats.org/officeDocument/2006/relationships" xmlns:p="http://schemas.openxmlformats.org/presentationml/2006/main">
+  <p:cSld>
+    <p:spTree>
+      <p:nvGrpSpPr>
+        <p:cNvPr id="1" name=""/>
+        <p:cNvGrpSpPr/>
+        <p:nvPr/>
+      </p:nvGrpSpPr>
+      <p:grpSpPr>
+        <a:xfrm>
+          <a:off x="0" y="0"/>
+          <a:ext cx="0" cy="0"/>
+          <a:chOff x="0" y="0"/>
+          <a:chExt cx="0" cy="0"/>
+        </a:xfrm>
+      </p:grpSpPr>
       <p:pic>
         <p:nvPicPr>
-          <p:cNvPr id="8" name="Marcador de contenido 7">
+          <p:cNvPr id="7" name="Imagen 6">
             <a:extLst>
               <a:ext uri="{FF2B5EF4-FFF2-40B4-BE49-F238E27FC236}">
-                <a16:creationId xmlns:a16="http://schemas.microsoft.com/office/drawing/2014/main" id="{71FA55C1-9DA3-4EFB-A177-365ED7222DD4}"/>
+                <a16:creationId xmlns:a16="http://schemas.microsoft.com/office/drawing/2014/main" id="{B2E8C7C1-ECFA-1945-A8C4-98982C752813}"/>
               </a:ext>
             </a:extLst>
           </p:cNvPr>
           <p:cNvPicPr>
-            <a:picLocks noGrp="1" noChangeAspect="1"/>
+            <a:picLocks noChangeAspect="1"/>
           </p:cNvPicPr>
-          <p:nvPr>
-            <p:ph idx="1"/>
-          </p:nvPr>
+          <p:nvPr/>
         </p:nvPicPr>
-        <p:blipFill rotWithShape="1">
+        <p:blipFill>
           <a:blip r:embed="rId2"/>
-          <a:srcRect l="2356" t="11507" r="34613" b="9345"/>
-          <a:stretch/>
+          <a:stretch>
+            <a:fillRect/>
+          </a:stretch>
         </p:blipFill>
         <p:spPr>
           <a:xfrm>
-            <a:off x="776958" y="372046"/>
-            <a:ext cx="10510886" cy="5486399"/>
+            <a:off x="0" y="888273"/>
+            <a:ext cx="11900263" cy="5373189"/>
           </a:xfrm>
+          <a:prstGeom prst="rect">
+            <a:avLst/>
+          </a:prstGeom>
         </p:spPr>
       </p:pic>
     </p:spTree>
@@ -2986,7 +5322,7 @@
 </p:sld>
 </file>
 
-<file path=ppt/slides/slide12.xml><?xml version="1.0" encoding="utf-8"?>
+<file path=ppt/slides/slide17.xml><?xml version="1.0" encoding="utf-8"?>
 <p:sld xmlns:a="http://schemas.openxmlformats.org/drawingml/2006/main" xmlns:r="http://schemas.openxmlformats.org/officeDocument/2006/relationships" xmlns:p="http://schemas.openxmlformats.org/presentationml/2006/main">
   <p:cSld>
     <p:spTree>
@@ -3040,7 +5376,7 @@
         <p:spPr/>
         <p:txBody>
           <a:bodyPr>
-            <a:normAutofit fontScale="85000" lnSpcReduction="10000"/>
+            <a:normAutofit fontScale="70000" lnSpcReduction="20000"/>
           </a:bodyPr>
           <a:lstStyle/>
           <a:p>
@@ -3048,781 +5384,10 @@
               <a:buNone/>
             </a:pPr>
             <a:r>
-              <a:rPr lang="en-US" sz="2000" b="0" i="0" dirty="0">
-                <a:solidFill>
-                  <a:srgbClr val="333333"/>
-                </a:solidFill>
-                <a:effectLst/>
+              <a:rPr lang="es-CO" sz="1800" dirty="0">
                 <a:latin typeface="Century Gothic" panose="020B0502020202020204" pitchFamily="34" charset="0"/>
               </a:rPr>
-              <a:t>   </a:t>
-            </a:r>
-            <a:r>
-              <a:rPr lang="en-US" sz="2000" b="0" i="0" dirty="0" err="1">
-                <a:solidFill>
-                  <a:srgbClr val="333333"/>
-                </a:solidFill>
-                <a:effectLst/>
-                <a:latin typeface="Century Gothic" panose="020B0502020202020204" pitchFamily="34" charset="0"/>
-              </a:rPr>
-              <a:t>Bhaduri</a:t>
-            </a:r>
-            <a:r>
-              <a:rPr lang="en-US" sz="2000" b="0" i="0" dirty="0">
-                <a:solidFill>
-                  <a:srgbClr val="333333"/>
-                </a:solidFill>
-                <a:effectLst/>
-                <a:latin typeface="Century Gothic" panose="020B0502020202020204" pitchFamily="34" charset="0"/>
-              </a:rPr>
-              <a:t>, Amit &amp; </a:t>
-            </a:r>
-            <a:r>
-              <a:rPr lang="en-US" sz="2000" b="0" i="0" dirty="0" err="1">
-                <a:solidFill>
-                  <a:srgbClr val="333333"/>
-                </a:solidFill>
-                <a:effectLst/>
-                <a:latin typeface="Century Gothic" panose="020B0502020202020204" pitchFamily="34" charset="0"/>
-              </a:rPr>
-              <a:t>Marglin</a:t>
-            </a:r>
-            <a:r>
-              <a:rPr lang="en-US" sz="2000" b="0" i="0" dirty="0">
-                <a:solidFill>
-                  <a:srgbClr val="333333"/>
-                </a:solidFill>
-                <a:effectLst/>
-                <a:latin typeface="Century Gothic" panose="020B0502020202020204" pitchFamily="34" charset="0"/>
-              </a:rPr>
-              <a:t>, Stephen, 1990. "</a:t>
-            </a:r>
-            <a:r>
-              <a:rPr lang="en-US" sz="2000" b="1" i="0" u="none" strike="noStrike" dirty="0">
-                <a:solidFill>
-                  <a:srgbClr val="2D4E8B"/>
-                </a:solidFill>
-                <a:effectLst/>
-                <a:latin typeface="Century Gothic" panose="020B0502020202020204" pitchFamily="34" charset="0"/>
-                <a:hlinkClick r:id="rId2"/>
-              </a:rPr>
-              <a:t>Unemployment and the Real Wage: The Economic Basis for Contesting Political Ideologies</a:t>
-            </a:r>
-            <a:r>
-              <a:rPr lang="en-US" sz="2000" b="0" i="0" dirty="0">
-                <a:solidFill>
-                  <a:srgbClr val="333333"/>
-                </a:solidFill>
-                <a:effectLst/>
-                <a:latin typeface="Century Gothic" panose="020B0502020202020204" pitchFamily="34" charset="0"/>
-              </a:rPr>
-              <a:t>," </a:t>
-            </a:r>
-            <a:r>
-              <a:rPr lang="en-US" sz="2000" b="0" i="0" u="none" strike="noStrike" dirty="0">
-                <a:solidFill>
-                  <a:srgbClr val="2D4E8B"/>
-                </a:solidFill>
-                <a:effectLst/>
-                <a:latin typeface="Century Gothic" panose="020B0502020202020204" pitchFamily="34" charset="0"/>
-                <a:hlinkClick r:id="rId3"/>
-              </a:rPr>
-              <a:t>Cambridge Journal of Economics</a:t>
-            </a:r>
-            <a:r>
-              <a:rPr lang="en-US" sz="2000" b="0" i="0" dirty="0">
-                <a:solidFill>
-                  <a:srgbClr val="333333"/>
-                </a:solidFill>
-                <a:effectLst/>
-                <a:latin typeface="Century Gothic" panose="020B0502020202020204" pitchFamily="34" charset="0"/>
-              </a:rPr>
-              <a:t>, Oxford University Press, vol. 14(4), pages 375-393, December.</a:t>
-            </a:r>
-          </a:p>
-          <a:p>
-            <a:pPr marL="0" indent="0" algn="just">
-              <a:buNone/>
-            </a:pPr>
-            <a:endParaRPr lang="es-CO" sz="2000" dirty="0">
-              <a:latin typeface="Century Gothic" panose="020B0502020202020204" pitchFamily="34" charset="0"/>
-            </a:endParaRPr>
-          </a:p>
-          <a:p>
-            <a:pPr marL="0" indent="0" algn="just">
-              <a:buNone/>
-            </a:pPr>
-            <a:r>
-              <a:rPr lang="es-CO" sz="2000" dirty="0">
-                <a:latin typeface="Century Gothic" panose="020B0502020202020204" pitchFamily="34" charset="0"/>
-              </a:rPr>
-              <a:t>   </a:t>
-            </a:r>
-            <a:r>
-              <a:rPr lang="es-CO" sz="2000" dirty="0" err="1">
-                <a:latin typeface="Century Gothic" panose="020B0502020202020204" pitchFamily="34" charset="0"/>
-              </a:rPr>
-              <a:t>Caiani</a:t>
-            </a:r>
-            <a:r>
-              <a:rPr lang="es-CO" sz="2000" dirty="0">
-                <a:latin typeface="Century Gothic" panose="020B0502020202020204" pitchFamily="34" charset="0"/>
-              </a:rPr>
-              <a:t>, Alessandro &amp; </a:t>
-            </a:r>
-            <a:r>
-              <a:rPr lang="es-CO" sz="2000" dirty="0" err="1">
-                <a:latin typeface="Century Gothic" panose="020B0502020202020204" pitchFamily="34" charset="0"/>
-              </a:rPr>
-              <a:t>Godin</a:t>
-            </a:r>
-            <a:r>
-              <a:rPr lang="es-CO" sz="2000" dirty="0">
-                <a:latin typeface="Century Gothic" panose="020B0502020202020204" pitchFamily="34" charset="0"/>
-              </a:rPr>
-              <a:t>, Antoine &amp; </a:t>
-            </a:r>
-            <a:r>
-              <a:rPr lang="es-CO" sz="2000" dirty="0" err="1">
-                <a:latin typeface="Century Gothic" panose="020B0502020202020204" pitchFamily="34" charset="0"/>
-              </a:rPr>
-              <a:t>Caverzasi</a:t>
-            </a:r>
-            <a:r>
-              <a:rPr lang="es-CO" sz="2000" dirty="0">
-                <a:latin typeface="Century Gothic" panose="020B0502020202020204" pitchFamily="34" charset="0"/>
-              </a:rPr>
-              <a:t>, Eugenio &amp; </a:t>
-            </a:r>
-            <a:r>
-              <a:rPr lang="es-CO" sz="2000" dirty="0" err="1">
-                <a:latin typeface="Century Gothic" panose="020B0502020202020204" pitchFamily="34" charset="0"/>
-              </a:rPr>
-              <a:t>Gallegati</a:t>
-            </a:r>
-            <a:r>
-              <a:rPr lang="es-CO" sz="2000" dirty="0">
-                <a:latin typeface="Century Gothic" panose="020B0502020202020204" pitchFamily="34" charset="0"/>
-              </a:rPr>
-              <a:t>, Mauro &amp; </a:t>
-            </a:r>
-            <a:r>
-              <a:rPr lang="es-CO" sz="2000" dirty="0" err="1">
-                <a:latin typeface="Century Gothic" panose="020B0502020202020204" pitchFamily="34" charset="0"/>
-              </a:rPr>
-              <a:t>Kinsella</a:t>
-            </a:r>
-            <a:r>
-              <a:rPr lang="es-CO" sz="2000" dirty="0">
-                <a:latin typeface="Century Gothic" panose="020B0502020202020204" pitchFamily="34" charset="0"/>
-              </a:rPr>
-              <a:t>, Stephen &amp; Stiglitz, Joseph E., 2016. "</a:t>
-            </a:r>
-            <a:r>
-              <a:rPr lang="es-CO" sz="2000" dirty="0" err="1">
-                <a:latin typeface="Century Gothic" panose="020B0502020202020204" pitchFamily="34" charset="0"/>
-                <a:hlinkClick r:id="rId4"/>
-              </a:rPr>
-              <a:t>Agent</a:t>
-            </a:r>
-            <a:r>
-              <a:rPr lang="es-CO" sz="2000" dirty="0">
-                <a:latin typeface="Century Gothic" panose="020B0502020202020204" pitchFamily="34" charset="0"/>
-                <a:hlinkClick r:id="rId4"/>
-              </a:rPr>
-              <a:t> </a:t>
-            </a:r>
-            <a:r>
-              <a:rPr lang="es-CO" sz="2000" dirty="0" err="1">
-                <a:latin typeface="Century Gothic" panose="020B0502020202020204" pitchFamily="34" charset="0"/>
-                <a:hlinkClick r:id="rId4"/>
-              </a:rPr>
-              <a:t>based</a:t>
-            </a:r>
-            <a:r>
-              <a:rPr lang="es-CO" sz="2000" dirty="0">
-                <a:latin typeface="Century Gothic" panose="020B0502020202020204" pitchFamily="34" charset="0"/>
-                <a:hlinkClick r:id="rId4"/>
-              </a:rPr>
-              <a:t>-stock </a:t>
-            </a:r>
-            <a:r>
-              <a:rPr lang="es-CO" sz="2000" dirty="0" err="1">
-                <a:latin typeface="Century Gothic" panose="020B0502020202020204" pitchFamily="34" charset="0"/>
-                <a:hlinkClick r:id="rId4"/>
-              </a:rPr>
-              <a:t>flow</a:t>
-            </a:r>
-            <a:r>
-              <a:rPr lang="es-CO" sz="2000" dirty="0">
-                <a:latin typeface="Century Gothic" panose="020B0502020202020204" pitchFamily="34" charset="0"/>
-                <a:hlinkClick r:id="rId4"/>
-              </a:rPr>
-              <a:t> </a:t>
-            </a:r>
-            <a:r>
-              <a:rPr lang="es-CO" sz="2000" dirty="0" err="1">
-                <a:latin typeface="Century Gothic" panose="020B0502020202020204" pitchFamily="34" charset="0"/>
-                <a:hlinkClick r:id="rId4"/>
-              </a:rPr>
-              <a:t>consistent</a:t>
-            </a:r>
-            <a:r>
-              <a:rPr lang="es-CO" sz="2000" dirty="0">
-                <a:latin typeface="Century Gothic" panose="020B0502020202020204" pitchFamily="34" charset="0"/>
-                <a:hlinkClick r:id="rId4"/>
-              </a:rPr>
-              <a:t> </a:t>
-            </a:r>
-            <a:r>
-              <a:rPr lang="es-CO" sz="2000" dirty="0" err="1">
-                <a:latin typeface="Century Gothic" panose="020B0502020202020204" pitchFamily="34" charset="0"/>
-                <a:hlinkClick r:id="rId4"/>
-              </a:rPr>
-              <a:t>macroeconomics</a:t>
-            </a:r>
-            <a:r>
-              <a:rPr lang="es-CO" sz="2000" dirty="0">
-                <a:latin typeface="Century Gothic" panose="020B0502020202020204" pitchFamily="34" charset="0"/>
-                <a:hlinkClick r:id="rId4"/>
-              </a:rPr>
-              <a:t>: </a:t>
-            </a:r>
-            <a:r>
-              <a:rPr lang="es-CO" sz="2000" dirty="0" err="1">
-                <a:latin typeface="Century Gothic" panose="020B0502020202020204" pitchFamily="34" charset="0"/>
-                <a:hlinkClick r:id="rId4"/>
-              </a:rPr>
-              <a:t>Towards</a:t>
-            </a:r>
-            <a:r>
-              <a:rPr lang="es-CO" sz="2000" dirty="0">
-                <a:latin typeface="Century Gothic" panose="020B0502020202020204" pitchFamily="34" charset="0"/>
-                <a:hlinkClick r:id="rId4"/>
-              </a:rPr>
-              <a:t> a </a:t>
-            </a:r>
-            <a:r>
-              <a:rPr lang="es-CO" sz="2000" dirty="0" err="1">
-                <a:latin typeface="Century Gothic" panose="020B0502020202020204" pitchFamily="34" charset="0"/>
-                <a:hlinkClick r:id="rId4"/>
-              </a:rPr>
-              <a:t>benchmark</a:t>
-            </a:r>
-            <a:r>
-              <a:rPr lang="es-CO" sz="2000" dirty="0">
-                <a:latin typeface="Century Gothic" panose="020B0502020202020204" pitchFamily="34" charset="0"/>
-                <a:hlinkClick r:id="rId4"/>
-              </a:rPr>
-              <a:t> </a:t>
-            </a:r>
-            <a:r>
-              <a:rPr lang="es-CO" sz="2000" dirty="0" err="1">
-                <a:latin typeface="Century Gothic" panose="020B0502020202020204" pitchFamily="34" charset="0"/>
-                <a:hlinkClick r:id="rId4"/>
-              </a:rPr>
-              <a:t>model</a:t>
-            </a:r>
-            <a:r>
-              <a:rPr lang="es-CO" sz="2000" dirty="0">
-                <a:latin typeface="Century Gothic" panose="020B0502020202020204" pitchFamily="34" charset="0"/>
-              </a:rPr>
-              <a:t>," </a:t>
-            </a:r>
-            <a:r>
-              <a:rPr lang="es-CO" sz="2000" dirty="0" err="1">
-                <a:latin typeface="Century Gothic" panose="020B0502020202020204" pitchFamily="34" charset="0"/>
-                <a:hlinkClick r:id="rId5"/>
-              </a:rPr>
-              <a:t>Journal</a:t>
-            </a:r>
-            <a:r>
-              <a:rPr lang="es-CO" sz="2000" dirty="0">
-                <a:latin typeface="Century Gothic" panose="020B0502020202020204" pitchFamily="34" charset="0"/>
-                <a:hlinkClick r:id="rId5"/>
-              </a:rPr>
-              <a:t> of </a:t>
-            </a:r>
-            <a:r>
-              <a:rPr lang="es-CO" sz="2000" dirty="0" err="1">
-                <a:latin typeface="Century Gothic" panose="020B0502020202020204" pitchFamily="34" charset="0"/>
-                <a:hlinkClick r:id="rId5"/>
-              </a:rPr>
-              <a:t>Economic</a:t>
-            </a:r>
-            <a:r>
-              <a:rPr lang="es-CO" sz="2000" dirty="0">
-                <a:latin typeface="Century Gothic" panose="020B0502020202020204" pitchFamily="34" charset="0"/>
-                <a:hlinkClick r:id="rId5"/>
-              </a:rPr>
-              <a:t> Dynamics and Control</a:t>
-            </a:r>
-            <a:r>
-              <a:rPr lang="es-CO" sz="2000" dirty="0">
-                <a:latin typeface="Century Gothic" panose="020B0502020202020204" pitchFamily="34" charset="0"/>
-              </a:rPr>
-              <a:t>, </a:t>
-            </a:r>
-            <a:r>
-              <a:rPr lang="es-CO" sz="2000" dirty="0" err="1">
-                <a:latin typeface="Century Gothic" panose="020B0502020202020204" pitchFamily="34" charset="0"/>
-              </a:rPr>
-              <a:t>Elsevier</a:t>
-            </a:r>
-            <a:r>
-              <a:rPr lang="es-CO" sz="2000" dirty="0">
-                <a:latin typeface="Century Gothic" panose="020B0502020202020204" pitchFamily="34" charset="0"/>
-              </a:rPr>
-              <a:t>, vol. 69(C), </a:t>
-            </a:r>
-            <a:r>
-              <a:rPr lang="es-CO" sz="2000" dirty="0" err="1">
-                <a:latin typeface="Century Gothic" panose="020B0502020202020204" pitchFamily="34" charset="0"/>
-              </a:rPr>
-              <a:t>pages</a:t>
-            </a:r>
-            <a:r>
-              <a:rPr lang="es-CO" sz="2000" dirty="0">
-                <a:latin typeface="Century Gothic" panose="020B0502020202020204" pitchFamily="34" charset="0"/>
-              </a:rPr>
-              <a:t> 375-408.</a:t>
-            </a:r>
-          </a:p>
-          <a:p>
-            <a:pPr marL="0" indent="0" algn="just">
-              <a:buNone/>
-            </a:pPr>
-            <a:endParaRPr lang="es-CO" sz="2000" dirty="0">
-              <a:latin typeface="Century Gothic" panose="020B0502020202020204" pitchFamily="34" charset="0"/>
-            </a:endParaRPr>
-          </a:p>
-          <a:p>
-            <a:pPr marL="0" indent="0" algn="just">
-              <a:buNone/>
-            </a:pPr>
-            <a:r>
-              <a:rPr lang="es-CO" sz="2000" dirty="0">
-                <a:latin typeface="Century Gothic" panose="020B0502020202020204" pitchFamily="34" charset="0"/>
-              </a:rPr>
-              <a:t>  </a:t>
-            </a:r>
-            <a:r>
-              <a:rPr lang="es-CO" sz="2000" dirty="0" err="1">
-                <a:latin typeface="Century Gothic" panose="020B0502020202020204" pitchFamily="34" charset="0"/>
-              </a:rPr>
-              <a:t>Dafermos</a:t>
-            </a:r>
-            <a:r>
-              <a:rPr lang="es-CO" sz="2000" dirty="0">
-                <a:latin typeface="Century Gothic" panose="020B0502020202020204" pitchFamily="34" charset="0"/>
-              </a:rPr>
-              <a:t>, </a:t>
-            </a:r>
-            <a:r>
-              <a:rPr lang="es-CO" sz="2000" dirty="0" err="1">
-                <a:latin typeface="Century Gothic" panose="020B0502020202020204" pitchFamily="34" charset="0"/>
-              </a:rPr>
-              <a:t>Yannis</a:t>
-            </a:r>
-            <a:r>
-              <a:rPr lang="es-CO" sz="2000" dirty="0">
-                <a:latin typeface="Century Gothic" panose="020B0502020202020204" pitchFamily="34" charset="0"/>
-              </a:rPr>
-              <a:t>,  2012. "</a:t>
-            </a:r>
-            <a:r>
-              <a:rPr lang="es-CO" sz="2000" dirty="0">
-                <a:latin typeface="Century Gothic" panose="020B0502020202020204" pitchFamily="34" charset="0"/>
-                <a:hlinkClick r:id="rId6"/>
-              </a:rPr>
-              <a:t>Liquidity </a:t>
-            </a:r>
-            <a:r>
-              <a:rPr lang="es-CO" sz="2000" dirty="0" err="1">
-                <a:latin typeface="Century Gothic" panose="020B0502020202020204" pitchFamily="34" charset="0"/>
-                <a:hlinkClick r:id="rId6"/>
-              </a:rPr>
-              <a:t>preference</a:t>
-            </a:r>
-            <a:r>
-              <a:rPr lang="es-CO" sz="2000" dirty="0">
-                <a:latin typeface="Century Gothic" panose="020B0502020202020204" pitchFamily="34" charset="0"/>
-                <a:hlinkClick r:id="rId6"/>
-              </a:rPr>
-              <a:t>, </a:t>
-            </a:r>
-            <a:r>
-              <a:rPr lang="es-CO" sz="2000" dirty="0" err="1">
-                <a:latin typeface="Century Gothic" panose="020B0502020202020204" pitchFamily="34" charset="0"/>
-                <a:hlinkClick r:id="rId6"/>
-              </a:rPr>
-              <a:t>uncertainty</a:t>
-            </a:r>
-            <a:r>
-              <a:rPr lang="es-CO" sz="2000" dirty="0">
-                <a:latin typeface="Century Gothic" panose="020B0502020202020204" pitchFamily="34" charset="0"/>
-                <a:hlinkClick r:id="rId6"/>
-              </a:rPr>
-              <a:t>, and </a:t>
-            </a:r>
-            <a:r>
-              <a:rPr lang="es-CO" sz="2000" dirty="0" err="1">
-                <a:latin typeface="Century Gothic" panose="020B0502020202020204" pitchFamily="34" charset="0"/>
-                <a:hlinkClick r:id="rId6"/>
-              </a:rPr>
-              <a:t>recession</a:t>
-            </a:r>
-            <a:r>
-              <a:rPr lang="es-CO" sz="2000" dirty="0">
-                <a:latin typeface="Century Gothic" panose="020B0502020202020204" pitchFamily="34" charset="0"/>
-                <a:hlinkClick r:id="rId6"/>
-              </a:rPr>
-              <a:t> in a stock-</a:t>
-            </a:r>
-            <a:r>
-              <a:rPr lang="es-CO" sz="2000" dirty="0" err="1">
-                <a:latin typeface="Century Gothic" panose="020B0502020202020204" pitchFamily="34" charset="0"/>
-                <a:hlinkClick r:id="rId6"/>
-              </a:rPr>
-              <a:t>flow</a:t>
-            </a:r>
-            <a:r>
-              <a:rPr lang="es-CO" sz="2000" dirty="0">
-                <a:latin typeface="Century Gothic" panose="020B0502020202020204" pitchFamily="34" charset="0"/>
-                <a:hlinkClick r:id="rId6"/>
-              </a:rPr>
-              <a:t> </a:t>
-            </a:r>
-            <a:r>
-              <a:rPr lang="es-CO" sz="2000" dirty="0" err="1">
-                <a:latin typeface="Century Gothic" panose="020B0502020202020204" pitchFamily="34" charset="0"/>
-                <a:hlinkClick r:id="rId6"/>
-              </a:rPr>
-              <a:t>consistent</a:t>
-            </a:r>
-            <a:r>
-              <a:rPr lang="es-CO" sz="2000" dirty="0">
-                <a:latin typeface="Century Gothic" panose="020B0502020202020204" pitchFamily="34" charset="0"/>
-                <a:hlinkClick r:id="rId6"/>
-              </a:rPr>
-              <a:t> </a:t>
-            </a:r>
-            <a:r>
-              <a:rPr lang="es-CO" sz="2000" dirty="0" err="1">
-                <a:latin typeface="Century Gothic" panose="020B0502020202020204" pitchFamily="34" charset="0"/>
-                <a:hlinkClick r:id="rId6"/>
-              </a:rPr>
-              <a:t>model</a:t>
-            </a:r>
-            <a:r>
-              <a:rPr lang="es-CO" sz="2000" dirty="0">
-                <a:latin typeface="Century Gothic" panose="020B0502020202020204" pitchFamily="34" charset="0"/>
-              </a:rPr>
-              <a:t>," </a:t>
-            </a:r>
-            <a:r>
-              <a:rPr lang="es-CO" sz="2000" dirty="0" err="1">
-                <a:latin typeface="Century Gothic" panose="020B0502020202020204" pitchFamily="34" charset="0"/>
-                <a:hlinkClick r:id="rId7"/>
-              </a:rPr>
-              <a:t>Journal</a:t>
-            </a:r>
-            <a:r>
-              <a:rPr lang="es-CO" sz="2000" dirty="0">
-                <a:latin typeface="Century Gothic" panose="020B0502020202020204" pitchFamily="34" charset="0"/>
-                <a:hlinkClick r:id="rId7"/>
-              </a:rPr>
-              <a:t> of Post </a:t>
-            </a:r>
-            <a:r>
-              <a:rPr lang="es-CO" sz="2000" dirty="0" err="1">
-                <a:latin typeface="Century Gothic" panose="020B0502020202020204" pitchFamily="34" charset="0"/>
-                <a:hlinkClick r:id="rId7"/>
-              </a:rPr>
-              <a:t>Keynesian</a:t>
-            </a:r>
-            <a:r>
-              <a:rPr lang="es-CO" sz="2000" dirty="0">
-                <a:latin typeface="Century Gothic" panose="020B0502020202020204" pitchFamily="34" charset="0"/>
-                <a:hlinkClick r:id="rId7"/>
-              </a:rPr>
-              <a:t> </a:t>
-            </a:r>
-            <a:r>
-              <a:rPr lang="es-CO" sz="2000" dirty="0" err="1">
-                <a:latin typeface="Century Gothic" panose="020B0502020202020204" pitchFamily="34" charset="0"/>
-                <a:hlinkClick r:id="rId7"/>
-              </a:rPr>
-              <a:t>Economics</a:t>
-            </a:r>
-            <a:r>
-              <a:rPr lang="es-CO" sz="2000" dirty="0">
-                <a:latin typeface="Century Gothic" panose="020B0502020202020204" pitchFamily="34" charset="0"/>
-              </a:rPr>
-              <a:t>, Taylor &amp; Francis </a:t>
-            </a:r>
-            <a:r>
-              <a:rPr lang="es-CO" sz="2000" dirty="0" err="1">
-                <a:latin typeface="Century Gothic" panose="020B0502020202020204" pitchFamily="34" charset="0"/>
-              </a:rPr>
-              <a:t>Journals</a:t>
-            </a:r>
-            <a:r>
-              <a:rPr lang="es-CO" sz="2000" dirty="0">
-                <a:latin typeface="Century Gothic" panose="020B0502020202020204" pitchFamily="34" charset="0"/>
-              </a:rPr>
-              <a:t>, vol. 34(4), </a:t>
-            </a:r>
-            <a:r>
-              <a:rPr lang="es-CO" sz="2000" dirty="0" err="1">
-                <a:latin typeface="Century Gothic" panose="020B0502020202020204" pitchFamily="34" charset="0"/>
-              </a:rPr>
-              <a:t>pages</a:t>
-            </a:r>
-            <a:r>
-              <a:rPr lang="es-CO" sz="2000" dirty="0">
-                <a:latin typeface="Century Gothic" panose="020B0502020202020204" pitchFamily="34" charset="0"/>
-              </a:rPr>
-              <a:t> 749-776.</a:t>
-            </a:r>
-          </a:p>
-          <a:p>
-            <a:pPr marL="0" indent="0" algn="just">
-              <a:buNone/>
-            </a:pPr>
-            <a:endParaRPr lang="es-CO" sz="2000" dirty="0">
-              <a:latin typeface="Century Gothic" panose="020B0502020202020204" pitchFamily="34" charset="0"/>
-            </a:endParaRPr>
-          </a:p>
-          <a:p>
-            <a:pPr marL="0" indent="0" algn="just">
-              <a:buNone/>
-            </a:pPr>
-            <a:r>
-              <a:rPr lang="en-US" sz="2000" dirty="0">
-                <a:latin typeface="Century Gothic" panose="020B0502020202020204" pitchFamily="34" charset="0"/>
-              </a:rPr>
-              <a:t>  </a:t>
-            </a:r>
-            <a:r>
-              <a:rPr lang="es-CO" sz="2000" dirty="0" err="1">
-                <a:latin typeface="Century Gothic" panose="020B0502020202020204" pitchFamily="34" charset="0"/>
-              </a:rPr>
-              <a:t>Till</a:t>
-            </a:r>
-            <a:r>
-              <a:rPr lang="es-CO" sz="2000" dirty="0">
-                <a:latin typeface="Century Gothic" panose="020B0502020202020204" pitchFamily="34" charset="0"/>
-              </a:rPr>
-              <a:t> van </a:t>
-            </a:r>
-            <a:r>
-              <a:rPr lang="es-CO" sz="2000" dirty="0" err="1">
-                <a:latin typeface="Century Gothic" panose="020B0502020202020204" pitchFamily="34" charset="0"/>
-              </a:rPr>
-              <a:t>Treeck</a:t>
-            </a:r>
-            <a:r>
-              <a:rPr lang="es-CO" sz="2000" dirty="0">
-                <a:latin typeface="Century Gothic" panose="020B0502020202020204" pitchFamily="34" charset="0"/>
-              </a:rPr>
-              <a:t>, 2007. "</a:t>
-            </a:r>
-            <a:r>
-              <a:rPr lang="es-CO" sz="2000" b="1" dirty="0">
-                <a:latin typeface="Century Gothic" panose="020B0502020202020204" pitchFamily="34" charset="0"/>
-                <a:hlinkClick r:id="rId8"/>
-              </a:rPr>
-              <a:t>A </a:t>
-            </a:r>
-            <a:r>
-              <a:rPr lang="es-CO" sz="2000" b="1" dirty="0" err="1">
-                <a:latin typeface="Century Gothic" panose="020B0502020202020204" pitchFamily="34" charset="0"/>
-                <a:hlinkClick r:id="rId8"/>
-              </a:rPr>
-              <a:t>Synthetic</a:t>
-            </a:r>
-            <a:r>
-              <a:rPr lang="es-CO" sz="2000" b="1" dirty="0">
-                <a:latin typeface="Century Gothic" panose="020B0502020202020204" pitchFamily="34" charset="0"/>
-                <a:hlinkClick r:id="rId8"/>
-              </a:rPr>
-              <a:t>, Stock-Flow </a:t>
-            </a:r>
-            <a:r>
-              <a:rPr lang="es-CO" sz="2000" b="1" dirty="0" err="1">
-                <a:latin typeface="Century Gothic" panose="020B0502020202020204" pitchFamily="34" charset="0"/>
-                <a:hlinkClick r:id="rId8"/>
-              </a:rPr>
-              <a:t>Consistent</a:t>
-            </a:r>
-            <a:r>
-              <a:rPr lang="es-CO" sz="2000" b="1" dirty="0">
-                <a:latin typeface="Century Gothic" panose="020B0502020202020204" pitchFamily="34" charset="0"/>
-                <a:hlinkClick r:id="rId8"/>
-              </a:rPr>
-              <a:t> </a:t>
-            </a:r>
-            <a:r>
-              <a:rPr lang="es-CO" sz="2000" b="1" dirty="0" err="1">
-                <a:latin typeface="Century Gothic" panose="020B0502020202020204" pitchFamily="34" charset="0"/>
-                <a:hlinkClick r:id="rId8"/>
-              </a:rPr>
-              <a:t>Macroeconomic</a:t>
-            </a:r>
-            <a:r>
-              <a:rPr lang="es-CO" sz="2000" b="1" dirty="0">
-                <a:latin typeface="Century Gothic" panose="020B0502020202020204" pitchFamily="34" charset="0"/>
-                <a:hlinkClick r:id="rId8"/>
-              </a:rPr>
-              <a:t> </a:t>
-            </a:r>
-            <a:r>
-              <a:rPr lang="es-CO" sz="2000" b="1" dirty="0" err="1">
-                <a:latin typeface="Century Gothic" panose="020B0502020202020204" pitchFamily="34" charset="0"/>
-                <a:hlinkClick r:id="rId8"/>
-              </a:rPr>
-              <a:t>Model</a:t>
-            </a:r>
-            <a:r>
-              <a:rPr lang="es-CO" sz="2000" b="1" dirty="0">
-                <a:latin typeface="Century Gothic" panose="020B0502020202020204" pitchFamily="34" charset="0"/>
-                <a:hlinkClick r:id="rId8"/>
-              </a:rPr>
-              <a:t> </a:t>
-            </a:r>
-            <a:r>
-              <a:rPr lang="es-CO" sz="2000" b="1" dirty="0" err="1">
-                <a:latin typeface="Century Gothic" panose="020B0502020202020204" pitchFamily="34" charset="0"/>
-                <a:hlinkClick r:id="rId8"/>
-              </a:rPr>
-              <a:t>of</a:t>
-            </a:r>
-            <a:r>
-              <a:rPr lang="es-CO" sz="2000" b="1" dirty="0">
-                <a:latin typeface="Century Gothic" panose="020B0502020202020204" pitchFamily="34" charset="0"/>
-                <a:hlinkClick r:id="rId8"/>
-              </a:rPr>
-              <a:t> </a:t>
-            </a:r>
-            <a:r>
-              <a:rPr lang="es-CO" sz="2000" b="1" dirty="0" err="1">
-                <a:latin typeface="Century Gothic" panose="020B0502020202020204" pitchFamily="34" charset="0"/>
-                <a:hlinkClick r:id="rId8"/>
-              </a:rPr>
-              <a:t>Financialisation</a:t>
-            </a:r>
-            <a:r>
-              <a:rPr lang="es-CO" sz="2000" dirty="0">
-                <a:latin typeface="Century Gothic" panose="020B0502020202020204" pitchFamily="34" charset="0"/>
-              </a:rPr>
-              <a:t>," </a:t>
-            </a:r>
-            <a:r>
-              <a:rPr lang="es-CO" sz="2000" dirty="0">
-                <a:latin typeface="Century Gothic" panose="020B0502020202020204" pitchFamily="34" charset="0"/>
-                <a:hlinkClick r:id="rId9"/>
-              </a:rPr>
-              <a:t>IMK </a:t>
-            </a:r>
-            <a:r>
-              <a:rPr lang="es-CO" sz="2000" dirty="0" err="1">
-                <a:latin typeface="Century Gothic" panose="020B0502020202020204" pitchFamily="34" charset="0"/>
-                <a:hlinkClick r:id="rId9"/>
-              </a:rPr>
-              <a:t>Working</a:t>
-            </a:r>
-            <a:r>
-              <a:rPr lang="es-CO" sz="2000" dirty="0">
-                <a:latin typeface="Century Gothic" panose="020B0502020202020204" pitchFamily="34" charset="0"/>
-                <a:hlinkClick r:id="rId9"/>
-              </a:rPr>
-              <a:t> </a:t>
-            </a:r>
-            <a:r>
-              <a:rPr lang="es-CO" sz="2000" dirty="0" err="1">
-                <a:latin typeface="Century Gothic" panose="020B0502020202020204" pitchFamily="34" charset="0"/>
-                <a:hlinkClick r:id="rId9"/>
-              </a:rPr>
-              <a:t>Paper</a:t>
-            </a:r>
-            <a:r>
-              <a:rPr lang="es-CO" sz="2000" dirty="0">
-                <a:latin typeface="Century Gothic" panose="020B0502020202020204" pitchFamily="34" charset="0"/>
-              </a:rPr>
-              <a:t> 06-2007, IMK at </a:t>
-            </a:r>
-            <a:r>
-              <a:rPr lang="es-CO" sz="2000" dirty="0" err="1">
-                <a:latin typeface="Century Gothic" panose="020B0502020202020204" pitchFamily="34" charset="0"/>
-              </a:rPr>
-              <a:t>the</a:t>
-            </a:r>
-            <a:r>
-              <a:rPr lang="es-CO" sz="2000" dirty="0">
-                <a:latin typeface="Century Gothic" panose="020B0502020202020204" pitchFamily="34" charset="0"/>
-              </a:rPr>
-              <a:t> Hans </a:t>
-            </a:r>
-            <a:r>
-              <a:rPr lang="es-CO" sz="2000" dirty="0" err="1">
-                <a:latin typeface="Century Gothic" panose="020B0502020202020204" pitchFamily="34" charset="0"/>
-              </a:rPr>
-              <a:t>Boeckler</a:t>
-            </a:r>
-            <a:r>
-              <a:rPr lang="es-CO" sz="2000" dirty="0">
-                <a:latin typeface="Century Gothic" panose="020B0502020202020204" pitchFamily="34" charset="0"/>
-              </a:rPr>
-              <a:t> </a:t>
-            </a:r>
-            <a:r>
-              <a:rPr lang="es-CO" sz="2000" dirty="0" err="1">
-                <a:latin typeface="Century Gothic" panose="020B0502020202020204" pitchFamily="34" charset="0"/>
-              </a:rPr>
-              <a:t>Foundation</a:t>
-            </a:r>
-            <a:r>
-              <a:rPr lang="es-CO" sz="2000" dirty="0">
-                <a:latin typeface="Century Gothic" panose="020B0502020202020204" pitchFamily="34" charset="0"/>
-              </a:rPr>
-              <a:t>, </a:t>
-            </a:r>
-            <a:r>
-              <a:rPr lang="es-CO" sz="2000" dirty="0" err="1">
-                <a:latin typeface="Century Gothic" panose="020B0502020202020204" pitchFamily="34" charset="0"/>
-              </a:rPr>
-              <a:t>Macroeconomic</a:t>
-            </a:r>
-            <a:r>
-              <a:rPr lang="es-CO" sz="2000" dirty="0">
-                <a:latin typeface="Century Gothic" panose="020B0502020202020204" pitchFamily="34" charset="0"/>
-              </a:rPr>
-              <a:t> </a:t>
-            </a:r>
-            <a:r>
-              <a:rPr lang="es-CO" sz="2000" dirty="0" err="1">
-                <a:latin typeface="Century Gothic" panose="020B0502020202020204" pitchFamily="34" charset="0"/>
-              </a:rPr>
-              <a:t>Policy</a:t>
-            </a:r>
-            <a:r>
-              <a:rPr lang="es-CO" sz="2000" dirty="0">
-                <a:latin typeface="Century Gothic" panose="020B0502020202020204" pitchFamily="34" charset="0"/>
-              </a:rPr>
-              <a:t> </a:t>
-            </a:r>
-            <a:r>
-              <a:rPr lang="es-CO" sz="2000" dirty="0" err="1">
-                <a:latin typeface="Century Gothic" panose="020B0502020202020204" pitchFamily="34" charset="0"/>
-              </a:rPr>
-              <a:t>Institute</a:t>
-            </a:r>
-            <a:r>
-              <a:rPr lang="es-CO" sz="2000" dirty="0">
-                <a:latin typeface="Century Gothic" panose="020B0502020202020204" pitchFamily="34" charset="0"/>
-              </a:rPr>
-              <a:t>.</a:t>
+              <a:t> Bhaduri, Amit &amp; Marglin, Stephen, (1990). "Unemployment and the Real Wage: The Economic Basis for Contesting Political Ideologies," Cambridge Journal of Economics, Oxford University Press, vol. 14(4), pages 375-393, December.</a:t>
             </a:r>
           </a:p>
           <a:p>
@@ -3832,6 +5397,112 @@
             <a:endParaRPr lang="es-CO" sz="1800" dirty="0">
               <a:latin typeface="Century Gothic" panose="020B0502020202020204" pitchFamily="34" charset="0"/>
             </a:endParaRPr>
+          </a:p>
+          <a:p>
+            <a:pPr marL="0" indent="0" algn="just">
+              <a:buNone/>
+            </a:pPr>
+            <a:r>
+              <a:rPr lang="es-CO" sz="1800" dirty="0">
+                <a:latin typeface="Century Gothic" panose="020B0502020202020204" pitchFamily="34" charset="0"/>
+              </a:rPr>
+              <a:t>   Caiani, Alessandro &amp; Godin, Antoine &amp; Caverzasi, Eugenio &amp; Gallegati, Mauro &amp; Kinsella, Stephen &amp; Stiglitz, Joseph E., (2016). "Agent based-stock flow consistent macroeconomics: Towards a benchmark model," Journal of Economic Dynamics and Control, Elsevier, vol. 69(C), pages 375-408.</a:t>
+            </a:r>
+          </a:p>
+          <a:p>
+            <a:pPr marL="0" indent="0" algn="just">
+              <a:buNone/>
+            </a:pPr>
+            <a:endParaRPr lang="es-CO" sz="1800" dirty="0">
+              <a:latin typeface="Century Gothic" panose="020B0502020202020204" pitchFamily="34" charset="0"/>
+            </a:endParaRPr>
+          </a:p>
+          <a:p>
+            <a:pPr marL="0" indent="0" algn="just">
+              <a:buNone/>
+            </a:pPr>
+            <a:r>
+              <a:rPr lang="es-CO" sz="1800" dirty="0">
+                <a:latin typeface="Century Gothic" panose="020B0502020202020204" pitchFamily="34" charset="0"/>
+              </a:rPr>
+              <a:t>  Dafermos, Yannis,  2012. "Liquidity preference, uncertainty, and recession in a stock-flow consistent model," Journal of Post Keynesian Economics, Taylor &amp; Francis Journals, vol. 34(4), pages 749-776.</a:t>
+            </a:r>
+          </a:p>
+          <a:p>
+            <a:pPr marL="0" indent="0" algn="just">
+              <a:buNone/>
+            </a:pPr>
+            <a:endParaRPr lang="es-CO" sz="1800" dirty="0">
+              <a:latin typeface="Century Gothic" panose="020B0502020202020204" pitchFamily="34" charset="0"/>
+            </a:endParaRPr>
+          </a:p>
+          <a:p>
+            <a:pPr marL="0" indent="0" algn="just">
+              <a:buNone/>
+            </a:pPr>
+            <a:r>
+              <a:rPr lang="es-CO" sz="1800" dirty="0">
+                <a:latin typeface="Century Gothic" panose="020B0502020202020204" pitchFamily="34" charset="0"/>
+              </a:rPr>
+              <a:t>Passarella, M. (2019). "From abstract to concrete: some tips for developing an empirical stockâ€“flow consistent model," European Journal of Economics and Economic Policies: Intervention, Edward Elgar Publishing, vol. 16(1), pages 55-93, April.</a:t>
+            </a:r>
+          </a:p>
+          <a:p>
+            <a:pPr marL="0" indent="0" algn="just">
+              <a:buNone/>
+            </a:pPr>
+            <a:endParaRPr lang="es-CO" sz="1800" dirty="0">
+              <a:latin typeface="Century Gothic" panose="020B0502020202020204" pitchFamily="34" charset="0"/>
+            </a:endParaRPr>
+          </a:p>
+          <a:p>
+            <a:pPr marL="0" indent="0" algn="just">
+              <a:buNone/>
+            </a:pPr>
+            <a:r>
+              <a:rPr lang="es-CO" sz="1800" dirty="0">
+                <a:latin typeface="Century Gothic" panose="020B0502020202020204" pitchFamily="34" charset="0"/>
+              </a:rPr>
+              <a:t>Pedrosa, I ; Biancarelli(2015).”Surges in capital inflows and the macroeconomic dynamics of peripheral economies- a stock-flow consistent model”.</a:t>
+            </a:r>
+          </a:p>
+          <a:p>
+            <a:pPr marL="0" indent="0" algn="just">
+              <a:buNone/>
+            </a:pPr>
+            <a:endParaRPr lang="es-CO" sz="1800" dirty="0">
+              <a:latin typeface="Century Gothic" panose="020B0502020202020204" pitchFamily="34" charset="0"/>
+            </a:endParaRPr>
+          </a:p>
+          <a:p>
+            <a:pPr marL="0" indent="0" algn="just">
+              <a:buNone/>
+            </a:pPr>
+            <a:r>
+              <a:rPr lang="es-CO" sz="1800" dirty="0">
+                <a:latin typeface="Century Gothic" panose="020B0502020202020204" pitchFamily="34" charset="0"/>
+              </a:rPr>
+              <a:t>  Till van Treeck, (2007). "A Synthetic, Stock-Flow Consistent Macroeconomic Model of Financialisation," IMK Working Paper 06-2007, IMK at the Hans Boeckler Foundation, Macroeconomic Policy Institute.</a:t>
+            </a:r>
+          </a:p>
+          <a:p>
+            <a:pPr marL="0" indent="0" algn="just">
+              <a:buNone/>
+            </a:pPr>
+            <a:endParaRPr lang="es-CO" sz="1800" dirty="0">
+              <a:latin typeface="Century Gothic" panose="020B0502020202020204" pitchFamily="34" charset="0"/>
+            </a:endParaRPr>
+          </a:p>
+          <a:p>
+            <a:pPr marL="0" indent="0" algn="just">
+              <a:buNone/>
+            </a:pPr>
+            <a:r>
+              <a:rPr lang="es-CO" sz="1800" dirty="0">
+                <a:latin typeface="Century Gothic" panose="020B0502020202020204" pitchFamily="34" charset="0"/>
+              </a:rPr>
+              <a:t>Valdecantos, S. (2016).”Estructura productiva y vulnerabilidad externa- un modelo estructuralista stock-flujo consistente”</a:t>
+            </a:r>
           </a:p>
         </p:txBody>
       </p:sp>
@@ -5514,8 +7185,8 @@
           <a:chExt cx="0" cy="0"/>
         </a:xfrm>
       </p:grpSpPr>
-      <mc:AlternateContent xmlns:mc="http://schemas.openxmlformats.org/markup-compatibility/2006">
-        <mc:Choice xmlns:a14="http://schemas.microsoft.com/office/drawing/2010/main" Requires="a14">
+      <mc:AlternateContent xmlns:mc="http://schemas.openxmlformats.org/markup-compatibility/2006" xmlns:a14="http://schemas.microsoft.com/office/drawing/2010/main">
+        <mc:Choice Requires="a14">
           <p:sp>
             <p:nvSpPr>
               <p:cNvPr id="2" name="Marcador de contenido 1">
@@ -7032,7 +8703,7 @@
             </p:txBody>
           </p:sp>
         </mc:Choice>
-        <mc:Fallback>
+        <mc:Fallback xmlns="">
           <p:sp>
             <p:nvSpPr>
               <p:cNvPr id="2" name="Marcador de contenido 1">
@@ -7144,8 +8815,8 @@
           <a:chExt cx="0" cy="0"/>
         </a:xfrm>
       </p:grpSpPr>
-      <mc:AlternateContent xmlns:mc="http://schemas.openxmlformats.org/markup-compatibility/2006">
-        <mc:Choice xmlns:a14="http://schemas.microsoft.com/office/drawing/2010/main" Requires="a14">
+      <mc:AlternateContent xmlns:mc="http://schemas.openxmlformats.org/markup-compatibility/2006" xmlns:a14="http://schemas.microsoft.com/office/drawing/2010/main">
+        <mc:Choice Requires="a14">
           <p:sp>
             <p:nvSpPr>
               <p:cNvPr id="2" name="Marcador de contenido 1">
@@ -8525,7 +10196,7 @@
             </p:txBody>
           </p:sp>
         </mc:Choice>
-        <mc:Fallback>
+        <mc:Fallback xmlns="">
           <p:sp>
             <p:nvSpPr>
               <p:cNvPr id="2" name="Marcador de contenido 1">
@@ -8637,8 +10308,8 @@
           <a:chExt cx="0" cy="0"/>
         </a:xfrm>
       </p:grpSpPr>
-      <mc:AlternateContent xmlns:mc="http://schemas.openxmlformats.org/markup-compatibility/2006">
-        <mc:Choice xmlns:a14="http://schemas.microsoft.com/office/drawing/2010/main" Requires="a14">
+      <mc:AlternateContent xmlns:mc="http://schemas.openxmlformats.org/markup-compatibility/2006" xmlns:a14="http://schemas.microsoft.com/office/drawing/2010/main">
+        <mc:Choice Requires="a14">
           <p:sp>
             <p:nvSpPr>
               <p:cNvPr id="2" name="Marcador de contenido 1">
@@ -9919,7 +11590,7 @@
             </p:txBody>
           </p:sp>
         </mc:Choice>
-        <mc:Fallback>
+        <mc:Fallback xmlns="">
           <p:sp>
             <p:nvSpPr>
               <p:cNvPr id="2" name="Marcador de contenido 1">
@@ -10031,8 +11702,8 @@
           <a:chExt cx="0" cy="0"/>
         </a:xfrm>
       </p:grpSpPr>
-      <mc:AlternateContent xmlns:mc="http://schemas.openxmlformats.org/markup-compatibility/2006">
-        <mc:Choice xmlns:a14="http://schemas.microsoft.com/office/drawing/2010/main" Requires="a14">
+      <mc:AlternateContent xmlns:mc="http://schemas.openxmlformats.org/markup-compatibility/2006" xmlns:a14="http://schemas.microsoft.com/office/drawing/2010/main">
+        <mc:Choice Requires="a14">
           <p:sp>
             <p:nvSpPr>
               <p:cNvPr id="2" name="Marcador de contenido 1">
@@ -10921,7 +12592,7 @@
             </p:txBody>
           </p:sp>
         </mc:Choice>
-        <mc:Fallback>
+        <mc:Fallback xmlns="">
           <p:sp>
             <p:nvSpPr>
               <p:cNvPr id="2" name="Marcador de contenido 1">

</xml_diff>

<commit_message>
Ownership structure and equities
</commit_message>
<xml_diff>
--- a/Documentos/Modelling Colombia Economy- Stock-Flow Consistent Prototype Growth Model.pptx
+++ b/Documentos/Modelling Colombia Economy- Stock-Flow Consistent Prototype Growth Model.pptx
@@ -213,7 +213,7 @@
           <a:p>
             <a:fld id="{D42B63A8-CA22-F249-8B11-75777F973014}" type="datetimeFigureOut">
               <a:rPr lang="es-ES_tradnl" smtClean="0"/>
-              <a:t>6/10/20</a:t>
+              <a:t>8/10/20</a:t>
             </a:fld>
             <a:endParaRPr lang="es-ES_tradnl"/>
           </a:p>
@@ -1500,7 +1500,7 @@
           <a:p>
             <a:fld id="{6C5AE33D-32CE-4125-A2FD-63556E695E13}" type="datetimeFigureOut">
               <a:rPr lang="es-CO" smtClean="0"/>
-              <a:t>6/10/20</a:t>
+              <a:t>8/10/20</a:t>
             </a:fld>
             <a:endParaRPr lang="es-CO"/>
           </a:p>
@@ -4372,8 +4372,8 @@
           <a:chExt cx="0" cy="0"/>
         </a:xfrm>
       </p:grpSpPr>
-      <mc:AlternateContent xmlns:mc="http://schemas.openxmlformats.org/markup-compatibility/2006" xmlns:a14="http://schemas.microsoft.com/office/drawing/2010/main">
-        <mc:Choice Requires="a14">
+      <mc:AlternateContent xmlns:mc="http://schemas.openxmlformats.org/markup-compatibility/2006">
+        <mc:Choice xmlns:a14="http://schemas.microsoft.com/office/drawing/2010/main" Requires="a14">
           <p:sp>
             <p:nvSpPr>
               <p:cNvPr id="2" name="Marcador de contenido 1">
@@ -4632,7 +4632,21 @@
                           <a:latin typeface="Cambria Math" panose="02040503050406030204" pitchFamily="18" charset="0"/>
                           <a:ea typeface="Cambria Math" panose="02040503050406030204" pitchFamily="18" charset="0"/>
                         </a:rPr>
-                        <m:t>(23)</m:t>
+                        <m:t>(2</m:t>
+                      </m:r>
+                      <m:r>
+                        <a:rPr lang="es-ES" sz="1800" b="0" i="1" smtClean="0">
+                          <a:latin typeface="Cambria Math" panose="02040503050406030204" pitchFamily="18" charset="0"/>
+                          <a:ea typeface="Cambria Math" panose="02040503050406030204" pitchFamily="18" charset="0"/>
+                        </a:rPr>
+                        <m:t>2</m:t>
+                      </m:r>
+                      <m:r>
+                        <a:rPr lang="es-ES" sz="1800" b="0" i="1" smtClean="0">
+                          <a:latin typeface="Cambria Math" panose="02040503050406030204" pitchFamily="18" charset="0"/>
+                          <a:ea typeface="Cambria Math" panose="02040503050406030204" pitchFamily="18" charset="0"/>
+                        </a:rPr>
+                        <m:t>)</m:t>
                       </m:r>
                     </m:oMath>
                   </m:oMathPara>
@@ -5019,7 +5033,21 @@
                           <a:latin typeface="Cambria Math" panose="02040503050406030204" pitchFamily="18" charset="0"/>
                           <a:ea typeface="Cambria Math" panose="02040503050406030204" pitchFamily="18" charset="0"/>
                         </a:rPr>
-                        <m:t>(24)</m:t>
+                        <m:t>(2</m:t>
+                      </m:r>
+                      <m:r>
+                        <a:rPr lang="es-ES" sz="1800" b="0" i="1" smtClean="0">
+                          <a:latin typeface="Cambria Math" panose="02040503050406030204" pitchFamily="18" charset="0"/>
+                          <a:ea typeface="Cambria Math" panose="02040503050406030204" pitchFamily="18" charset="0"/>
+                        </a:rPr>
+                        <m:t>3</m:t>
+                      </m:r>
+                      <m:r>
+                        <a:rPr lang="es-ES" sz="1800" b="0" i="1" smtClean="0">
+                          <a:latin typeface="Cambria Math" panose="02040503050406030204" pitchFamily="18" charset="0"/>
+                          <a:ea typeface="Cambria Math" panose="02040503050406030204" pitchFamily="18" charset="0"/>
+                        </a:rPr>
+                        <m:t>)</m:t>
                       </m:r>
                     </m:oMath>
                   </m:oMathPara>
@@ -5031,7 +5059,7 @@
             </p:txBody>
           </p:sp>
         </mc:Choice>
-        <mc:Fallback xmlns="">
+        <mc:Fallback>
           <p:sp>
             <p:nvSpPr>
               <p:cNvPr id="2" name="Marcador de contenido 1">

</xml_diff>